<commit_message>
WebMedia - alterações na apresentação
</commit_message>
<xml_diff>
--- a/1-Meus-Artigos/WebMedia11/apresentação.pptx
+++ b/1-Meus-Artigos/WebMedia11/apresentação.pptx
@@ -5,7 +5,7 @@
     <p:sldMasterId id="2147483660" r:id="rId1"/>
   </p:sldMasterIdLst>
   <p:notesMasterIdLst>
-    <p:notesMasterId r:id="rId27"/>
+    <p:notesMasterId r:id="rId28"/>
   </p:notesMasterIdLst>
   <p:sldIdLst>
     <p:sldId id="380" r:id="rId2"/>
@@ -31,8 +31,9 @@
     <p:sldId id="412" r:id="rId22"/>
     <p:sldId id="357" r:id="rId23"/>
     <p:sldId id="413" r:id="rId24"/>
-    <p:sldId id="397" r:id="rId25"/>
-    <p:sldId id="387" r:id="rId26"/>
+    <p:sldId id="414" r:id="rId25"/>
+    <p:sldId id="397" r:id="rId26"/>
+    <p:sldId id="387" r:id="rId27"/>
   </p:sldIdLst>
   <p:sldSz cx="9144000" cy="6858000" type="screen4x3"/>
   <p:notesSz cx="6858000" cy="9144000"/>
@@ -163,6 +164,7 @@
             <p14:sldId id="412"/>
             <p14:sldId id="357"/>
             <p14:sldId id="413"/>
+            <p14:sldId id="414"/>
             <p14:sldId id="397"/>
             <p14:sldId id="387"/>
           </p14:sldIdLst>
@@ -4914,15 +4916,15 @@
     </dgm:pt>
   </dgm:ptLst>
   <dgm:cxnLst>
+    <dgm:cxn modelId="{53E35895-2F36-4A36-BDBE-968FC7DCFA03}" type="presOf" srcId="{F9BF59C0-DF44-4744-B321-308C735D2948}" destId="{8282B123-79D2-4E0A-BF9E-E258F9155E15}" srcOrd="0" destOrd="0" presId="urn:microsoft.com/office/officeart/2005/8/layout/hierarchy6"/>
+    <dgm:cxn modelId="{F1061816-A18B-4FC1-A359-A60F2784B418}" type="presOf" srcId="{32F57AC1-33E6-4385-87AA-54CA417DA641}" destId="{6C530A79-90C4-49C8-A5F2-23392F853946}" srcOrd="0" destOrd="0" presId="urn:microsoft.com/office/officeart/2005/8/layout/hierarchy6"/>
+    <dgm:cxn modelId="{004668C6-636E-442F-A3B5-F636D87D01D6}" type="presOf" srcId="{AFD31390-6AC1-4FA3-BAED-940C68F6DC88}" destId="{DE5A9EAF-482B-4BF2-AF77-13EAE24C70B0}" srcOrd="0" destOrd="0" presId="urn:microsoft.com/office/officeart/2005/8/layout/hierarchy6"/>
+    <dgm:cxn modelId="{0A9A73B4-8113-4C08-A673-9B556311F2C8}" type="presOf" srcId="{5FF24799-9D94-4C82-BD4D-140D4015CB2B}" destId="{ED59F7BD-492C-44FF-BA19-C9825A4FB025}" srcOrd="0" destOrd="0" presId="urn:microsoft.com/office/officeart/2005/8/layout/hierarchy6"/>
+    <dgm:cxn modelId="{FCB2D6CE-8717-47E7-995E-65EFF0F08B11}" type="presOf" srcId="{8D5FDD50-92B6-484D-9F33-ECBEC3DBA967}" destId="{28B760FA-B381-41EC-8B4D-492CAB381BC4}" srcOrd="0" destOrd="0" presId="urn:microsoft.com/office/officeart/2005/8/layout/hierarchy6"/>
+    <dgm:cxn modelId="{5759436E-0925-4D61-A8DD-C88825E506BA}" srcId="{8D5FDD50-92B6-484D-9F33-ECBEC3DBA967}" destId="{32F57AC1-33E6-4385-87AA-54CA417DA641}" srcOrd="0" destOrd="0" parTransId="{4CF32539-B159-4D5B-8813-0F2517A92619}" sibTransId="{1D3139AF-ED12-4B35-986A-3B8D78646C94}"/>
     <dgm:cxn modelId="{4DB2AC0F-39E4-401D-8E5C-59CAB2B05FD6}" srcId="{32F57AC1-33E6-4385-87AA-54CA417DA641}" destId="{AFD31390-6AC1-4FA3-BAED-940C68F6DC88}" srcOrd="0" destOrd="0" parTransId="{5FF24799-9D94-4C82-BD4D-140D4015CB2B}" sibTransId="{419E9FC1-BC4A-4460-8112-FCFA3CD98EFD}"/>
-    <dgm:cxn modelId="{004668C6-636E-442F-A3B5-F636D87D01D6}" type="presOf" srcId="{AFD31390-6AC1-4FA3-BAED-940C68F6DC88}" destId="{DE5A9EAF-482B-4BF2-AF77-13EAE24C70B0}" srcOrd="0" destOrd="0" presId="urn:microsoft.com/office/officeart/2005/8/layout/hierarchy6"/>
-    <dgm:cxn modelId="{5759436E-0925-4D61-A8DD-C88825E506BA}" srcId="{8D5FDD50-92B6-484D-9F33-ECBEC3DBA967}" destId="{32F57AC1-33E6-4385-87AA-54CA417DA641}" srcOrd="0" destOrd="0" parTransId="{4CF32539-B159-4D5B-8813-0F2517A92619}" sibTransId="{1D3139AF-ED12-4B35-986A-3B8D78646C94}"/>
-    <dgm:cxn modelId="{53E35895-2F36-4A36-BDBE-968FC7DCFA03}" type="presOf" srcId="{F9BF59C0-DF44-4744-B321-308C735D2948}" destId="{8282B123-79D2-4E0A-BF9E-E258F9155E15}" srcOrd="0" destOrd="0" presId="urn:microsoft.com/office/officeart/2005/8/layout/hierarchy6"/>
-    <dgm:cxn modelId="{FCB2D6CE-8717-47E7-995E-65EFF0F08B11}" type="presOf" srcId="{8D5FDD50-92B6-484D-9F33-ECBEC3DBA967}" destId="{28B760FA-B381-41EC-8B4D-492CAB381BC4}" srcOrd="0" destOrd="0" presId="urn:microsoft.com/office/officeart/2005/8/layout/hierarchy6"/>
     <dgm:cxn modelId="{D80D7AE6-A288-4AE0-A87E-C8BF62689CBC}" type="presOf" srcId="{27D2D03C-6B7C-48CB-A639-65E257CC0E96}" destId="{F1E4FA91-E817-4642-B67C-69461E749193}" srcOrd="0" destOrd="0" presId="urn:microsoft.com/office/officeart/2005/8/layout/hierarchy6"/>
     <dgm:cxn modelId="{2C2A58B9-C1C1-4E99-8F9F-57F5352C17B3}" srcId="{32F57AC1-33E6-4385-87AA-54CA417DA641}" destId="{F9BF59C0-DF44-4744-B321-308C735D2948}" srcOrd="1" destOrd="0" parTransId="{27D2D03C-6B7C-48CB-A639-65E257CC0E96}" sibTransId="{621FCEB5-3DC7-49FE-9793-8D4BC0648D86}"/>
-    <dgm:cxn modelId="{F1061816-A18B-4FC1-A359-A60F2784B418}" type="presOf" srcId="{32F57AC1-33E6-4385-87AA-54CA417DA641}" destId="{6C530A79-90C4-49C8-A5F2-23392F853946}" srcOrd="0" destOrd="0" presId="urn:microsoft.com/office/officeart/2005/8/layout/hierarchy6"/>
-    <dgm:cxn modelId="{0A9A73B4-8113-4C08-A673-9B556311F2C8}" type="presOf" srcId="{5FF24799-9D94-4C82-BD4D-140D4015CB2B}" destId="{ED59F7BD-492C-44FF-BA19-C9825A4FB025}" srcOrd="0" destOrd="0" presId="urn:microsoft.com/office/officeart/2005/8/layout/hierarchy6"/>
     <dgm:cxn modelId="{01C084E6-06BF-40DF-97F9-CF53110D2EFA}" type="presParOf" srcId="{28B760FA-B381-41EC-8B4D-492CAB381BC4}" destId="{3B16B6A1-0DAE-46FF-8BBD-EDBC7A332D6C}" srcOrd="0" destOrd="0" presId="urn:microsoft.com/office/officeart/2005/8/layout/hierarchy6"/>
     <dgm:cxn modelId="{5CDB1497-D513-4D10-B950-18D42EAB158F}" type="presParOf" srcId="{3B16B6A1-0DAE-46FF-8BBD-EDBC7A332D6C}" destId="{010D124E-7220-40C4-B1FE-D515AE2A5227}" srcOrd="0" destOrd="0" presId="urn:microsoft.com/office/officeart/2005/8/layout/hierarchy6"/>
     <dgm:cxn modelId="{8F8BA655-EFE8-4863-880B-3BA379315418}" type="presParOf" srcId="{010D124E-7220-40C4-B1FE-D515AE2A5227}" destId="{D546113F-0EE7-47CB-AF4A-7B882A2C2C6B}" srcOrd="0" destOrd="0" presId="urn:microsoft.com/office/officeart/2005/8/layout/hierarchy6"/>
@@ -5280,8 +5282,8 @@
   <dgm:cxnLst>
     <dgm:cxn modelId="{82F0E81E-DAC9-4792-85EB-6245521B3649}" type="presOf" srcId="{27D2D03C-6B7C-48CB-A639-65E257CC0E96}" destId="{F1E4FA91-E817-4642-B67C-69461E749193}" srcOrd="0" destOrd="0" presId="urn:microsoft.com/office/officeart/2005/8/layout/hierarchy6"/>
     <dgm:cxn modelId="{29E23185-68A7-4CD7-BD72-E8C7F32B9362}" type="presOf" srcId="{32F57AC1-33E6-4385-87AA-54CA417DA641}" destId="{6C530A79-90C4-49C8-A5F2-23392F853946}" srcOrd="0" destOrd="0" presId="urn:microsoft.com/office/officeart/2005/8/layout/hierarchy6"/>
+    <dgm:cxn modelId="{C222B294-DFEC-43CD-9CD2-DFCE7014AEED}" type="presOf" srcId="{AFD31390-6AC1-4FA3-BAED-940C68F6DC88}" destId="{DE5A9EAF-482B-4BF2-AF77-13EAE24C70B0}" srcOrd="0" destOrd="0" presId="urn:microsoft.com/office/officeart/2005/8/layout/hierarchy6"/>
     <dgm:cxn modelId="{D49DD3FD-FB88-4273-BE45-99886164EFF5}" type="presOf" srcId="{5FF24799-9D94-4C82-BD4D-140D4015CB2B}" destId="{ED59F7BD-492C-44FF-BA19-C9825A4FB025}" srcOrd="0" destOrd="0" presId="urn:microsoft.com/office/officeart/2005/8/layout/hierarchy6"/>
-    <dgm:cxn modelId="{C222B294-DFEC-43CD-9CD2-DFCE7014AEED}" type="presOf" srcId="{AFD31390-6AC1-4FA3-BAED-940C68F6DC88}" destId="{DE5A9EAF-482B-4BF2-AF77-13EAE24C70B0}" srcOrd="0" destOrd="0" presId="urn:microsoft.com/office/officeart/2005/8/layout/hierarchy6"/>
     <dgm:cxn modelId="{A0896631-453E-46C3-BF2F-E0CEB3C0F1A8}" type="presOf" srcId="{8D5FDD50-92B6-484D-9F33-ECBEC3DBA967}" destId="{28B760FA-B381-41EC-8B4D-492CAB381BC4}" srcOrd="0" destOrd="0" presId="urn:microsoft.com/office/officeart/2005/8/layout/hierarchy6"/>
     <dgm:cxn modelId="{B62AFAAE-765F-47EE-BB3A-B4EB5DD06408}" type="presOf" srcId="{ED7F2F8B-596F-4ACC-88C7-425BD0C69125}" destId="{382C07DB-DF31-4C35-A8A6-001339A6AF65}" srcOrd="0" destOrd="0" presId="urn:microsoft.com/office/officeart/2005/8/layout/hierarchy6"/>
     <dgm:cxn modelId="{5759436E-0925-4D61-A8DD-C88825E506BA}" srcId="{8D5FDD50-92B6-484D-9F33-ECBEC3DBA967}" destId="{32F57AC1-33E6-4385-87AA-54CA417DA641}" srcOrd="0" destOrd="0" parTransId="{4CF32539-B159-4D5B-8813-0F2517A92619}" sibTransId="{1D3139AF-ED12-4B35-986A-3B8D78646C94}"/>
@@ -6020,18 +6022,18 @@
     </dgm:pt>
   </dgm:ptLst>
   <dgm:cxnLst>
+    <dgm:cxn modelId="{4CA00E5D-1EBF-4828-8766-20AFCDA02601}" type="presOf" srcId="{ED7F2F8B-596F-4ACC-88C7-425BD0C69125}" destId="{382C07DB-DF31-4C35-A8A6-001339A6AF65}" srcOrd="0" destOrd="0" presId="urn:microsoft.com/office/officeart/2005/8/layout/hierarchy6"/>
+    <dgm:cxn modelId="{BC7C02D1-0FE7-4D59-A7A9-4A6C0CE62957}" type="presOf" srcId="{AFD31390-6AC1-4FA3-BAED-940C68F6DC88}" destId="{DE5A9EAF-482B-4BF2-AF77-13EAE24C70B0}" srcOrd="0" destOrd="0" presId="urn:microsoft.com/office/officeart/2005/8/layout/hierarchy6"/>
+    <dgm:cxn modelId="{29C965D7-810F-4E4A-8F78-ACE73CE7859B}" type="presOf" srcId="{F9BF59C0-DF44-4744-B321-308C735D2948}" destId="{8282B123-79D2-4E0A-BF9E-E258F9155E15}" srcOrd="0" destOrd="0" presId="urn:microsoft.com/office/officeart/2005/8/layout/hierarchy6"/>
+    <dgm:cxn modelId="{38FA2057-D5B7-4EA5-B19D-B2D5C65D90D6}" type="presOf" srcId="{27D2D03C-6B7C-48CB-A639-65E257CC0E96}" destId="{F1E4FA91-E817-4642-B67C-69461E749193}" srcOrd="0" destOrd="0" presId="urn:microsoft.com/office/officeart/2005/8/layout/hierarchy6"/>
+    <dgm:cxn modelId="{99AE3A12-1D41-416C-B4D8-A2E3AAC38EB9}" type="presOf" srcId="{CB4D62B7-20A0-42CA-B7A0-532513CCE3B9}" destId="{6B9BE3B4-6371-45FE-A71C-6E55CC800E74}" srcOrd="0" destOrd="0" presId="urn:microsoft.com/office/officeart/2005/8/layout/hierarchy6"/>
+    <dgm:cxn modelId="{5759436E-0925-4D61-A8DD-C88825E506BA}" srcId="{8D5FDD50-92B6-484D-9F33-ECBEC3DBA967}" destId="{32F57AC1-33E6-4385-87AA-54CA417DA641}" srcOrd="0" destOrd="0" parTransId="{4CF32539-B159-4D5B-8813-0F2517A92619}" sibTransId="{1D3139AF-ED12-4B35-986A-3B8D78646C94}"/>
+    <dgm:cxn modelId="{4FA01C49-3583-4E6B-A51C-E0F5BFFCD85F}" type="presOf" srcId="{5FF24799-9D94-4C82-BD4D-140D4015CB2B}" destId="{ED59F7BD-492C-44FF-BA19-C9825A4FB025}" srcOrd="0" destOrd="0" presId="urn:microsoft.com/office/officeart/2005/8/layout/hierarchy6"/>
+    <dgm:cxn modelId="{B001E01C-AF69-4B79-A4F1-94C26395D088}" srcId="{AFD31390-6AC1-4FA3-BAED-940C68F6DC88}" destId="{ED7F2F8B-596F-4ACC-88C7-425BD0C69125}" srcOrd="0" destOrd="0" parTransId="{CB4D62B7-20A0-42CA-B7A0-532513CCE3B9}" sibTransId="{57829ED3-75E3-4323-A3BE-308A2C52FF80}"/>
     <dgm:cxn modelId="{4DB2AC0F-39E4-401D-8E5C-59CAB2B05FD6}" srcId="{32F57AC1-33E6-4385-87AA-54CA417DA641}" destId="{AFD31390-6AC1-4FA3-BAED-940C68F6DC88}" srcOrd="0" destOrd="0" parTransId="{5FF24799-9D94-4C82-BD4D-140D4015CB2B}" sibTransId="{419E9FC1-BC4A-4460-8112-FCFA3CD98EFD}"/>
-    <dgm:cxn modelId="{38FA2057-D5B7-4EA5-B19D-B2D5C65D90D6}" type="presOf" srcId="{27D2D03C-6B7C-48CB-A639-65E257CC0E96}" destId="{F1E4FA91-E817-4642-B67C-69461E749193}" srcOrd="0" destOrd="0" presId="urn:microsoft.com/office/officeart/2005/8/layout/hierarchy6"/>
-    <dgm:cxn modelId="{5759436E-0925-4D61-A8DD-C88825E506BA}" srcId="{8D5FDD50-92B6-484D-9F33-ECBEC3DBA967}" destId="{32F57AC1-33E6-4385-87AA-54CA417DA641}" srcOrd="0" destOrd="0" parTransId="{4CF32539-B159-4D5B-8813-0F2517A92619}" sibTransId="{1D3139AF-ED12-4B35-986A-3B8D78646C94}"/>
-    <dgm:cxn modelId="{29C965D7-810F-4E4A-8F78-ACE73CE7859B}" type="presOf" srcId="{F9BF59C0-DF44-4744-B321-308C735D2948}" destId="{8282B123-79D2-4E0A-BF9E-E258F9155E15}" srcOrd="0" destOrd="0" presId="urn:microsoft.com/office/officeart/2005/8/layout/hierarchy6"/>
-    <dgm:cxn modelId="{B001E01C-AF69-4B79-A4F1-94C26395D088}" srcId="{AFD31390-6AC1-4FA3-BAED-940C68F6DC88}" destId="{ED7F2F8B-596F-4ACC-88C7-425BD0C69125}" srcOrd="0" destOrd="0" parTransId="{CB4D62B7-20A0-42CA-B7A0-532513CCE3B9}" sibTransId="{57829ED3-75E3-4323-A3BE-308A2C52FF80}"/>
-    <dgm:cxn modelId="{BC7C02D1-0FE7-4D59-A7A9-4A6C0CE62957}" type="presOf" srcId="{AFD31390-6AC1-4FA3-BAED-940C68F6DC88}" destId="{DE5A9EAF-482B-4BF2-AF77-13EAE24C70B0}" srcOrd="0" destOrd="0" presId="urn:microsoft.com/office/officeart/2005/8/layout/hierarchy6"/>
     <dgm:cxn modelId="{AB99C9CC-D2A8-4EBA-A99E-78AD977634D5}" type="presOf" srcId="{32F57AC1-33E6-4385-87AA-54CA417DA641}" destId="{6C530A79-90C4-49C8-A5F2-23392F853946}" srcOrd="0" destOrd="0" presId="urn:microsoft.com/office/officeart/2005/8/layout/hierarchy6"/>
-    <dgm:cxn modelId="{4FA01C49-3583-4E6B-A51C-E0F5BFFCD85F}" type="presOf" srcId="{5FF24799-9D94-4C82-BD4D-140D4015CB2B}" destId="{ED59F7BD-492C-44FF-BA19-C9825A4FB025}" srcOrd="0" destOrd="0" presId="urn:microsoft.com/office/officeart/2005/8/layout/hierarchy6"/>
+    <dgm:cxn modelId="{C9E88F0C-E962-465E-93FD-F2A3D853755C}" type="presOf" srcId="{8D5FDD50-92B6-484D-9F33-ECBEC3DBA967}" destId="{28B760FA-B381-41EC-8B4D-492CAB381BC4}" srcOrd="0" destOrd="0" presId="urn:microsoft.com/office/officeart/2005/8/layout/hierarchy6"/>
     <dgm:cxn modelId="{2C2A58B9-C1C1-4E99-8F9F-57F5352C17B3}" srcId="{32F57AC1-33E6-4385-87AA-54CA417DA641}" destId="{F9BF59C0-DF44-4744-B321-308C735D2948}" srcOrd="1" destOrd="0" parTransId="{27D2D03C-6B7C-48CB-A639-65E257CC0E96}" sibTransId="{621FCEB5-3DC7-49FE-9793-8D4BC0648D86}"/>
-    <dgm:cxn modelId="{4CA00E5D-1EBF-4828-8766-20AFCDA02601}" type="presOf" srcId="{ED7F2F8B-596F-4ACC-88C7-425BD0C69125}" destId="{382C07DB-DF31-4C35-A8A6-001339A6AF65}" srcOrd="0" destOrd="0" presId="urn:microsoft.com/office/officeart/2005/8/layout/hierarchy6"/>
-    <dgm:cxn modelId="{C9E88F0C-E962-465E-93FD-F2A3D853755C}" type="presOf" srcId="{8D5FDD50-92B6-484D-9F33-ECBEC3DBA967}" destId="{28B760FA-B381-41EC-8B4D-492CAB381BC4}" srcOrd="0" destOrd="0" presId="urn:microsoft.com/office/officeart/2005/8/layout/hierarchy6"/>
-    <dgm:cxn modelId="{99AE3A12-1D41-416C-B4D8-A2E3AAC38EB9}" type="presOf" srcId="{CB4D62B7-20A0-42CA-B7A0-532513CCE3B9}" destId="{6B9BE3B4-6371-45FE-A71C-6E55CC800E74}" srcOrd="0" destOrd="0" presId="urn:microsoft.com/office/officeart/2005/8/layout/hierarchy6"/>
     <dgm:cxn modelId="{E89A7F4F-07B4-47DD-8CC7-C7FA03448336}" type="presParOf" srcId="{28B760FA-B381-41EC-8B4D-492CAB381BC4}" destId="{3B16B6A1-0DAE-46FF-8BBD-EDBC7A332D6C}" srcOrd="0" destOrd="0" presId="urn:microsoft.com/office/officeart/2005/8/layout/hierarchy6"/>
     <dgm:cxn modelId="{A6663658-0DAF-4852-A350-334F1B8A8844}" type="presParOf" srcId="{3B16B6A1-0DAE-46FF-8BBD-EDBC7A332D6C}" destId="{010D124E-7220-40C4-B1FE-D515AE2A5227}" srcOrd="0" destOrd="0" presId="urn:microsoft.com/office/officeart/2005/8/layout/hierarchy6"/>
     <dgm:cxn modelId="{9A0BDC47-1AB9-4C71-9B72-57BE8CD1BD68}" type="presParOf" srcId="{010D124E-7220-40C4-B1FE-D515AE2A5227}" destId="{D546113F-0EE7-47CB-AF4A-7B882A2C2C6B}" srcOrd="0" destOrd="0" presId="urn:microsoft.com/office/officeart/2005/8/layout/hierarchy6"/>
@@ -6751,6 +6753,13 @@
     <dgm:pt modelId="{8BA0AC6D-FB62-4023-9560-7795C8FCF18A}" type="pres">
       <dgm:prSet presAssocID="{3AB2A8B7-4546-4A7A-A8B3-C4FA1503D461}" presName="Name64" presStyleLbl="parChTrans1D4" presStyleIdx="1" presStyleCnt="4"/>
       <dgm:spPr/>
+      <dgm:t>
+        <a:bodyPr/>
+        <a:lstStyle/>
+        <a:p>
+          <a:endParaRPr lang="pt-BR"/>
+        </a:p>
+      </dgm:t>
     </dgm:pt>
     <dgm:pt modelId="{BFCAF676-71A0-49D7-92AC-15090F686683}" type="pres">
       <dgm:prSet presAssocID="{25A57A78-3369-4BCF-815C-0B22E2608E08}" presName="hierRoot2" presStyleCnt="0">
@@ -6801,6 +6810,13 @@
     <dgm:pt modelId="{6E2B3A26-71DA-4F63-96B3-F61754FE836F}" type="pres">
       <dgm:prSet presAssocID="{CC3C8AD3-B3C5-4651-B1FE-BA1AA29381BD}" presName="Name64" presStyleLbl="parChTrans1D4" presStyleIdx="2" presStyleCnt="4"/>
       <dgm:spPr/>
+      <dgm:t>
+        <a:bodyPr/>
+        <a:lstStyle/>
+        <a:p>
+          <a:endParaRPr lang="pt-BR"/>
+        </a:p>
+      </dgm:t>
     </dgm:pt>
     <dgm:pt modelId="{3A400FDF-04F8-45C3-9610-AAF57CCE9CE0}" type="pres">
       <dgm:prSet presAssocID="{64D5634E-3AB1-4D4E-A0CE-65CEDD45A8B5}" presName="hierRoot2" presStyleCnt="0">
@@ -6979,24 +6995,24 @@
     <dgm:cxn modelId="{24AE312D-8A46-41B5-B693-7A4D682E63A1}" srcId="{750F83C2-2489-4726-9F9E-35A74BCAC319}" destId="{A32FD129-6951-4DA3-AA90-F3C05BC06034}" srcOrd="0" destOrd="0" parTransId="{16209A0E-84FC-46DC-AE6A-BE9F605141B0}" sibTransId="{A454572B-D4CD-4F98-9279-7773859EB7DF}"/>
     <dgm:cxn modelId="{E8D8FB7E-2CC3-472A-A5CB-8AF426375DFA}" type="presOf" srcId="{750F83C2-2489-4726-9F9E-35A74BCAC319}" destId="{7A3CB1A1-112F-4DDF-BD1C-3E83DBE185B0}" srcOrd="0" destOrd="0" presId="urn:microsoft.com/office/officeart/2009/3/layout/HorizontalOrganizationChart"/>
     <dgm:cxn modelId="{5879B574-D7C3-4CD2-B564-A4F8C9ED7E06}" type="presOf" srcId="{487E4310-5651-4700-A39E-2AEC0EA9F67D}" destId="{B339D220-7BC0-4E8D-89F9-55EDE464832D}" srcOrd="0" destOrd="0" presId="urn:microsoft.com/office/officeart/2009/3/layout/HorizontalOrganizationChart"/>
+    <dgm:cxn modelId="{8A647632-3074-4609-A48F-D2B6C9A65967}" type="presOf" srcId="{CC3C8AD3-B3C5-4651-B1FE-BA1AA29381BD}" destId="{6E2B3A26-71DA-4F63-96B3-F61754FE836F}" srcOrd="0" destOrd="0" presId="urn:microsoft.com/office/officeart/2009/3/layout/HorizontalOrganizationChart"/>
     <dgm:cxn modelId="{A5C4477C-F394-4A3D-81B1-9E8616A310E1}" type="presOf" srcId="{074180C9-AA60-4E57-A9E5-27EE30923DF8}" destId="{E9B8B215-D2F5-4E9F-BE36-683CF88B43B6}" srcOrd="0" destOrd="0" presId="urn:microsoft.com/office/officeart/2009/3/layout/HorizontalOrganizationChart"/>
-    <dgm:cxn modelId="{8A647632-3074-4609-A48F-D2B6C9A65967}" type="presOf" srcId="{CC3C8AD3-B3C5-4651-B1FE-BA1AA29381BD}" destId="{6E2B3A26-71DA-4F63-96B3-F61754FE836F}" srcOrd="0" destOrd="0" presId="urn:microsoft.com/office/officeart/2009/3/layout/HorizontalOrganizationChart"/>
     <dgm:cxn modelId="{C9D7E4A8-5ADF-49C1-BC4A-0B86D1AA734E}" type="presOf" srcId="{00F27E76-D053-4838-B0FC-ECD625A2F185}" destId="{6E2D032B-DF4D-4C82-A2E6-3483FB5435A1}" srcOrd="0" destOrd="0" presId="urn:microsoft.com/office/officeart/2009/3/layout/HorizontalOrganizationChart"/>
     <dgm:cxn modelId="{51F00E53-F189-420B-8F58-0D8937759DCC}" type="presOf" srcId="{A32FD129-6951-4DA3-AA90-F3C05BC06034}" destId="{56E76F2F-7431-42E1-ACCC-02B79A77D018}" srcOrd="0" destOrd="0" presId="urn:microsoft.com/office/officeart/2009/3/layout/HorizontalOrganizationChart"/>
     <dgm:cxn modelId="{F2D022F5-CFD1-4BE9-8EF1-E4A99A4F2F49}" type="presOf" srcId="{3AB2A8B7-4546-4A7A-A8B3-C4FA1503D461}" destId="{8BA0AC6D-FB62-4023-9560-7795C8FCF18A}" srcOrd="0" destOrd="0" presId="urn:microsoft.com/office/officeart/2009/3/layout/HorizontalOrganizationChart"/>
+    <dgm:cxn modelId="{8FC6EC44-FEC3-41EF-A206-32B18D7A9225}" type="presOf" srcId="{25A57A78-3369-4BCF-815C-0B22E2608E08}" destId="{6A9CEB36-09B3-4FAE-B93F-4728BEE0A697}" srcOrd="0" destOrd="0" presId="urn:microsoft.com/office/officeart/2009/3/layout/HorizontalOrganizationChart"/>
     <dgm:cxn modelId="{EEB4E85F-CC24-4EE9-AA50-EFA5553A88DB}" type="presOf" srcId="{120B4DC1-BE43-44CA-BAC8-D47AFD74228A}" destId="{2C6C9DA7-D985-4E9A-B607-56D60461266A}" srcOrd="0" destOrd="0" presId="urn:microsoft.com/office/officeart/2009/3/layout/HorizontalOrganizationChart"/>
-    <dgm:cxn modelId="{8FC6EC44-FEC3-41EF-A206-32B18D7A9225}" type="presOf" srcId="{25A57A78-3369-4BCF-815C-0B22E2608E08}" destId="{6A9CEB36-09B3-4FAE-B93F-4728BEE0A697}" srcOrd="0" destOrd="0" presId="urn:microsoft.com/office/officeart/2009/3/layout/HorizontalOrganizationChart"/>
     <dgm:cxn modelId="{D5DCD302-A927-4E98-A240-4157DFA64781}" type="presOf" srcId="{120B4DC1-BE43-44CA-BAC8-D47AFD74228A}" destId="{8BA48D2F-6A6C-411C-8D81-7633043C1F47}" srcOrd="1" destOrd="0" presId="urn:microsoft.com/office/officeart/2009/3/layout/HorizontalOrganizationChart"/>
     <dgm:cxn modelId="{E676DA69-5D24-4E9F-A733-E98B100DF40E}" srcId="{00F27E76-D053-4838-B0FC-ECD625A2F185}" destId="{120B4DC1-BE43-44CA-BAC8-D47AFD74228A}" srcOrd="0" destOrd="0" parTransId="{7F290ED6-4613-4839-8B5C-6BBBC2E74564}" sibTransId="{E30ADA23-9AE4-4A79-92C7-7CFE72E8B3D0}"/>
+    <dgm:cxn modelId="{FCB3A072-39C2-4836-A02C-2177C06187F4}" type="presOf" srcId="{64D5634E-3AB1-4D4E-A0CE-65CEDD45A8B5}" destId="{CBC638A5-BB29-4EA2-83C8-42AB74CEED47}" srcOrd="1" destOrd="0" presId="urn:microsoft.com/office/officeart/2009/3/layout/HorizontalOrganizationChart"/>
     <dgm:cxn modelId="{D6520D39-3530-469E-AD59-70CDE683966F}" srcId="{074180C9-AA60-4E57-A9E5-27EE30923DF8}" destId="{5B9CD8AB-CA1C-4C3C-B5D8-A1890CEB0195}" srcOrd="0" destOrd="0" parTransId="{075AE697-E1A9-4658-8586-5D55C7F7D836}" sibTransId="{2B0D433A-76F3-4840-AF85-E0766D3DB483}"/>
-    <dgm:cxn modelId="{FCB3A072-39C2-4836-A02C-2177C06187F4}" type="presOf" srcId="{64D5634E-3AB1-4D4E-A0CE-65CEDD45A8B5}" destId="{CBC638A5-BB29-4EA2-83C8-42AB74CEED47}" srcOrd="1" destOrd="0" presId="urn:microsoft.com/office/officeart/2009/3/layout/HorizontalOrganizationChart"/>
     <dgm:cxn modelId="{C38329A7-A1A2-4DCF-B825-6A994C25B4D0}" srcId="{A32FD129-6951-4DA3-AA90-F3C05BC06034}" destId="{00F27E76-D053-4838-B0FC-ECD625A2F185}" srcOrd="0" destOrd="0" parTransId="{487E4310-5651-4700-A39E-2AEC0EA9F67D}" sibTransId="{9F343612-9E05-4E74-9BB0-0F127CCEA8D2}"/>
     <dgm:cxn modelId="{6638BBD6-47BF-4618-B8A2-A1E355CE4847}" type="presOf" srcId="{00F27E76-D053-4838-B0FC-ECD625A2F185}" destId="{CC8CC60C-3915-44D5-839B-F30D4D658A7D}" srcOrd="1" destOrd="0" presId="urn:microsoft.com/office/officeart/2009/3/layout/HorizontalOrganizationChart"/>
     <dgm:cxn modelId="{4C8F3498-C5E0-42A6-B349-2CF1DA10FB59}" type="presOf" srcId="{075AE697-E1A9-4658-8586-5D55C7F7D836}" destId="{866D1971-0D1B-4602-AC13-75E3B5D1B981}" srcOrd="0" destOrd="0" presId="urn:microsoft.com/office/officeart/2009/3/layout/HorizontalOrganizationChart"/>
     <dgm:cxn modelId="{0342080F-204C-47FB-A2E9-80460D61FBB7}" type="presOf" srcId="{7F290ED6-4613-4839-8B5C-6BBBC2E74564}" destId="{E2E01032-55EC-4490-A2E2-EAE58D3C5B9E}" srcOrd="0" destOrd="0" presId="urn:microsoft.com/office/officeart/2009/3/layout/HorizontalOrganizationChart"/>
     <dgm:cxn modelId="{7BDAA234-45E7-4306-B7A2-4DB991B71D86}" type="presOf" srcId="{08AE8121-44A9-49E7-BB6A-8CDCF1FE8595}" destId="{3D7F2BD7-EEFA-4A09-BAAA-A5467747A5B4}" srcOrd="0" destOrd="0" presId="urn:microsoft.com/office/officeart/2009/3/layout/HorizontalOrganizationChart"/>
+    <dgm:cxn modelId="{64E96AB2-661B-4200-9C16-439E0AF431F7}" srcId="{120B4DC1-BE43-44CA-BAC8-D47AFD74228A}" destId="{64D5634E-3AB1-4D4E-A0CE-65CEDD45A8B5}" srcOrd="2" destOrd="0" parTransId="{CC3C8AD3-B3C5-4651-B1FE-BA1AA29381BD}" sibTransId="{47A19732-75F7-4558-81B2-46F64A7D9DAF}"/>
     <dgm:cxn modelId="{36B69AA3-D859-48DF-9248-9C24FBA9E44F}" type="presOf" srcId="{5B9CD8AB-CA1C-4C3C-B5D8-A1890CEB0195}" destId="{4B0C367F-7037-4653-AA15-D06435589E37}" srcOrd="0" destOrd="0" presId="urn:microsoft.com/office/officeart/2009/3/layout/HorizontalOrganizationChart"/>
-    <dgm:cxn modelId="{64E96AB2-661B-4200-9C16-439E0AF431F7}" srcId="{120B4DC1-BE43-44CA-BAC8-D47AFD74228A}" destId="{64D5634E-3AB1-4D4E-A0CE-65CEDD45A8B5}" srcOrd="2" destOrd="0" parTransId="{CC3C8AD3-B3C5-4651-B1FE-BA1AA29381BD}" sibTransId="{47A19732-75F7-4558-81B2-46F64A7D9DAF}"/>
     <dgm:cxn modelId="{98ED4D4E-A5C6-43DD-A367-647B5A6958A7}" srcId="{120B4DC1-BE43-44CA-BAC8-D47AFD74228A}" destId="{3A52C428-20B3-4453-BFAF-58617BB8395D}" srcOrd="0" destOrd="0" parTransId="{08AE8121-44A9-49E7-BB6A-8CDCF1FE8595}" sibTransId="{C598FDE5-7F6A-4E58-B919-2135218176CC}"/>
     <dgm:cxn modelId="{59104E4B-3A4E-49C4-96F1-5547C94256E6}" type="presOf" srcId="{64D5634E-3AB1-4D4E-A0CE-65CEDD45A8B5}" destId="{2BC73F47-C72F-4D61-8427-070979F74DB3}" srcOrd="0" destOrd="0" presId="urn:microsoft.com/office/officeart/2009/3/layout/HorizontalOrganizationChart"/>
     <dgm:cxn modelId="{25E392C7-8538-47E7-B294-49ECCC3C53E2}" type="presOf" srcId="{5B9CD8AB-CA1C-4C3C-B5D8-A1890CEB0195}" destId="{A6C869B9-5992-48C0-80E2-751984EC983A}" srcOrd="1" destOrd="0" presId="urn:microsoft.com/office/officeart/2009/3/layout/HorizontalOrganizationChart"/>
@@ -7006,8 +7022,8 @@
     <dgm:cxn modelId="{FD1FE62F-1421-4B85-9F8F-D4F54C4949F5}" type="presOf" srcId="{A32FD129-6951-4DA3-AA90-F3C05BC06034}" destId="{64B7FFAB-DB58-4496-BD6D-66B80A109E4B}" srcOrd="1" destOrd="0" presId="urn:microsoft.com/office/officeart/2009/3/layout/HorizontalOrganizationChart"/>
     <dgm:cxn modelId="{85559C45-F850-40CA-BA9D-39D3848DE98E}" type="presOf" srcId="{25A57A78-3369-4BCF-815C-0B22E2608E08}" destId="{2BEFA912-6DC4-4E7D-8A8B-C96CD1786C31}" srcOrd="1" destOrd="0" presId="urn:microsoft.com/office/officeart/2009/3/layout/HorizontalOrganizationChart"/>
     <dgm:cxn modelId="{B08F31BF-FC33-4C2A-8372-96AB3F46D663}" type="presOf" srcId="{074180C9-AA60-4E57-A9E5-27EE30923DF8}" destId="{BCCD1092-6C7C-4334-929F-60511043A205}" srcOrd="1" destOrd="0" presId="urn:microsoft.com/office/officeart/2009/3/layout/HorizontalOrganizationChart"/>
+    <dgm:cxn modelId="{70544E30-710B-44DD-A4D7-D2F78B5B0864}" type="presOf" srcId="{3A52C428-20B3-4453-BFAF-58617BB8395D}" destId="{BBE5A1C6-478A-4322-902B-D26E10E2B5D2}" srcOrd="0" destOrd="0" presId="urn:microsoft.com/office/officeart/2009/3/layout/HorizontalOrganizationChart"/>
     <dgm:cxn modelId="{F16546F4-32AE-45A9-AF2F-DF3CE1929978}" type="presOf" srcId="{D9DA6E55-9A37-4AE6-AA38-4292EDC51FBE}" destId="{69541900-6A79-4139-8AA7-BCAF9BC48D16}" srcOrd="0" destOrd="0" presId="urn:microsoft.com/office/officeart/2009/3/layout/HorizontalOrganizationChart"/>
-    <dgm:cxn modelId="{70544E30-710B-44DD-A4D7-D2F78B5B0864}" type="presOf" srcId="{3A52C428-20B3-4453-BFAF-58617BB8395D}" destId="{BBE5A1C6-478A-4322-902B-D26E10E2B5D2}" srcOrd="0" destOrd="0" presId="urn:microsoft.com/office/officeart/2009/3/layout/HorizontalOrganizationChart"/>
     <dgm:cxn modelId="{A5A60E45-E0B7-4ECC-B0BE-DA394998D3ED}" type="presParOf" srcId="{7A3CB1A1-112F-4DDF-BD1C-3E83DBE185B0}" destId="{807D473F-1CF3-47D8-B9DA-0CDCBE173537}" srcOrd="0" destOrd="0" presId="urn:microsoft.com/office/officeart/2009/3/layout/HorizontalOrganizationChart"/>
     <dgm:cxn modelId="{F96BEB7A-245D-4BAF-A425-5F8A54ABB45B}" type="presParOf" srcId="{807D473F-1CF3-47D8-B9DA-0CDCBE173537}" destId="{26A40E7C-324B-4B04-A8F9-4B84778D99F8}" srcOrd="0" destOrd="0" presId="urn:microsoft.com/office/officeart/2009/3/layout/HorizontalOrganizationChart"/>
     <dgm:cxn modelId="{AD9DE499-ACB3-4E2C-AAC5-7620849192E2}" type="presParOf" srcId="{26A40E7C-324B-4B04-A8F9-4B84778D99F8}" destId="{56E76F2F-7431-42E1-ACCC-02B79A77D018}" srcOrd="0" destOrd="0" presId="urn:microsoft.com/office/officeart/2009/3/layout/HorizontalOrganizationChart"/>
@@ -7322,7 +7338,6 @@
             <a:rPr lang="en-US" noProof="0" dirty="0" smtClean="0"/>
             <a:t>Anaglyph Reversion</a:t>
           </a:r>
-          <a:endParaRPr lang="en-US" noProof="0" dirty="0" smtClean="0"/>
         </a:p>
       </dgm:t>
     </dgm:pt>
@@ -7532,16 +7547,16 @@
   <dgm:cxnLst>
     <dgm:cxn modelId="{E59F1D5F-D2B2-4B99-8185-E04DB5BC9111}" type="presOf" srcId="{5FF24799-9D94-4C82-BD4D-140D4015CB2B}" destId="{ED59F7BD-492C-44FF-BA19-C9825A4FB025}" srcOrd="0" destOrd="0" presId="urn:microsoft.com/office/officeart/2005/8/layout/hierarchy6"/>
     <dgm:cxn modelId="{B59FB2B7-9F9C-48A6-B5EC-68F537AFD06B}" type="presOf" srcId="{CB4D62B7-20A0-42CA-B7A0-532513CCE3B9}" destId="{6B9BE3B4-6371-45FE-A71C-6E55CC800E74}" srcOrd="0" destOrd="0" presId="urn:microsoft.com/office/officeart/2005/8/layout/hierarchy6"/>
+    <dgm:cxn modelId="{9FFA1BA4-FC9A-4DDA-847F-46C4972572E8}" type="presOf" srcId="{ED7F2F8B-596F-4ACC-88C7-425BD0C69125}" destId="{382C07DB-DF31-4C35-A8A6-001339A6AF65}" srcOrd="0" destOrd="0" presId="urn:microsoft.com/office/officeart/2005/8/layout/hierarchy6"/>
     <dgm:cxn modelId="{D79E6E1C-006A-484F-89D3-0EF7CDEBC98F}" type="presOf" srcId="{8D5FDD50-92B6-484D-9F33-ECBEC3DBA967}" destId="{28B760FA-B381-41EC-8B4D-492CAB381BC4}" srcOrd="0" destOrd="0" presId="urn:microsoft.com/office/officeart/2005/8/layout/hierarchy6"/>
-    <dgm:cxn modelId="{9FFA1BA4-FC9A-4DDA-847F-46C4972572E8}" type="presOf" srcId="{ED7F2F8B-596F-4ACC-88C7-425BD0C69125}" destId="{382C07DB-DF31-4C35-A8A6-001339A6AF65}" srcOrd="0" destOrd="0" presId="urn:microsoft.com/office/officeart/2005/8/layout/hierarchy6"/>
     <dgm:cxn modelId="{E321EA38-2628-4CF3-8F50-3ED3E95AE68C}" type="presOf" srcId="{5AC319E5-1379-4860-865D-82CA5F8F6D74}" destId="{6C9A0E75-2E9F-4357-954E-2D66B9CAC58C}" srcOrd="0" destOrd="0" presId="urn:microsoft.com/office/officeart/2005/8/layout/hierarchy6"/>
     <dgm:cxn modelId="{7392C6EB-508A-4B02-BE5F-BB3C2216E605}" type="presOf" srcId="{AFD31390-6AC1-4FA3-BAED-940C68F6DC88}" destId="{DE5A9EAF-482B-4BF2-AF77-13EAE24C70B0}" srcOrd="0" destOrd="0" presId="urn:microsoft.com/office/officeart/2005/8/layout/hierarchy6"/>
     <dgm:cxn modelId="{159EE1B3-9E64-4E30-AFCF-044524B8FF5C}" type="presOf" srcId="{27D2D03C-6B7C-48CB-A639-65E257CC0E96}" destId="{F1E4FA91-E817-4642-B67C-69461E749193}" srcOrd="0" destOrd="0" presId="urn:microsoft.com/office/officeart/2005/8/layout/hierarchy6"/>
     <dgm:cxn modelId="{5759436E-0925-4D61-A8DD-C88825E506BA}" srcId="{8D5FDD50-92B6-484D-9F33-ECBEC3DBA967}" destId="{32F57AC1-33E6-4385-87AA-54CA417DA641}" srcOrd="0" destOrd="0" parTransId="{4CF32539-B159-4D5B-8813-0F2517A92619}" sibTransId="{1D3139AF-ED12-4B35-986A-3B8D78646C94}"/>
     <dgm:cxn modelId="{4DB2AC0F-39E4-401D-8E5C-59CAB2B05FD6}" srcId="{32F57AC1-33E6-4385-87AA-54CA417DA641}" destId="{AFD31390-6AC1-4FA3-BAED-940C68F6DC88}" srcOrd="0" destOrd="0" parTransId="{5FF24799-9D94-4C82-BD4D-140D4015CB2B}" sibTransId="{419E9FC1-BC4A-4460-8112-FCFA3CD98EFD}"/>
     <dgm:cxn modelId="{B001E01C-AF69-4B79-A4F1-94C26395D088}" srcId="{AFD31390-6AC1-4FA3-BAED-940C68F6DC88}" destId="{ED7F2F8B-596F-4ACC-88C7-425BD0C69125}" srcOrd="0" destOrd="0" parTransId="{CB4D62B7-20A0-42CA-B7A0-532513CCE3B9}" sibTransId="{57829ED3-75E3-4323-A3BE-308A2C52FF80}"/>
+    <dgm:cxn modelId="{201D97B0-C741-4DCB-BEB0-E8237029A570}" type="presOf" srcId="{796B1FE4-BA91-4115-9C79-7C9D8BC050E3}" destId="{CEA2203F-6CE8-44B9-9465-03032392CF78}" srcOrd="0" destOrd="0" presId="urn:microsoft.com/office/officeart/2005/8/layout/hierarchy6"/>
     <dgm:cxn modelId="{87D3E681-2FB0-4582-9374-F097D923F37E}" type="presOf" srcId="{F9BF59C0-DF44-4744-B321-308C735D2948}" destId="{8282B123-79D2-4E0A-BF9E-E258F9155E15}" srcOrd="0" destOrd="0" presId="urn:microsoft.com/office/officeart/2005/8/layout/hierarchy6"/>
-    <dgm:cxn modelId="{201D97B0-C741-4DCB-BEB0-E8237029A570}" type="presOf" srcId="{796B1FE4-BA91-4115-9C79-7C9D8BC050E3}" destId="{CEA2203F-6CE8-44B9-9465-03032392CF78}" srcOrd="0" destOrd="0" presId="urn:microsoft.com/office/officeart/2005/8/layout/hierarchy6"/>
     <dgm:cxn modelId="{2C2A58B9-C1C1-4E99-8F9F-57F5352C17B3}" srcId="{32F57AC1-33E6-4385-87AA-54CA417DA641}" destId="{F9BF59C0-DF44-4744-B321-308C735D2948}" srcOrd="1" destOrd="0" parTransId="{27D2D03C-6B7C-48CB-A639-65E257CC0E96}" sibTransId="{621FCEB5-3DC7-49FE-9793-8D4BC0648D86}"/>
     <dgm:cxn modelId="{5C5643DF-501E-4C4D-AD3C-AE8B6623289F}" srcId="{F9BF59C0-DF44-4744-B321-308C735D2948}" destId="{5AC319E5-1379-4860-865D-82CA5F8F6D74}" srcOrd="0" destOrd="0" parTransId="{796B1FE4-BA91-4115-9C79-7C9D8BC050E3}" sibTransId="{80556F87-8DB5-487B-B9F7-E91301DA1B52}"/>
     <dgm:cxn modelId="{9AE69B3D-AB06-4EC4-A783-EBF88405AE52}" type="presOf" srcId="{32F57AC1-33E6-4385-87AA-54CA417DA641}" destId="{6C530A79-90C4-49C8-A5F2-23392F853946}" srcOrd="0" destOrd="0" presId="urn:microsoft.com/office/officeart/2005/8/layout/hierarchy6"/>
@@ -11094,7 +11109,6 @@
             <a:rPr lang="en-US" sz="2200" kern="1200" noProof="0" dirty="0" smtClean="0"/>
             <a:t>Anaglyph Reversion</a:t>
           </a:r>
-          <a:endParaRPr lang="en-US" sz="2200" kern="1200" noProof="0" dirty="0" smtClean="0"/>
         </a:p>
       </dsp:txBody>
       <dsp:txXfrm>
@@ -21131,7 +21145,7 @@
           <a:p>
             <a:fld id="{0B368503-99CB-41EB-9D67-4ADA1DCFFC7F}" type="datetimeFigureOut">
               <a:rPr lang="pt-BR" smtClean="0"/>
-              <a:t>26/09/2011</a:t>
+              <a:t>27/9/2011</a:t>
             </a:fld>
             <a:endParaRPr lang="pt-BR" dirty="0"/>
           </a:p>
@@ -22204,7 +22218,7 @@
           <a:p>
             <a:fld id="{1145560E-C839-40E2-957A-A4B404157F19}" type="slidenum">
               <a:rPr lang="pt-BR" smtClean="0"/>
-              <a:t>24</a:t>
+              <a:t>25</a:t>
             </a:fld>
             <a:endParaRPr lang="pt-BR" dirty="0"/>
           </a:p>
@@ -23217,7 +23231,7 @@
           <a:p>
             <a:fld id="{EBDDE201-C26D-40BB-A193-6F0035D73FBF}" type="datetime1">
               <a:rPr lang="pt-BR" smtClean="0"/>
-              <a:t>26/09/2011</a:t>
+              <a:t>27/9/2011</a:t>
             </a:fld>
             <a:endParaRPr lang="pt-BR" dirty="0"/>
           </a:p>
@@ -23404,7 +23418,7 @@
           <a:p>
             <a:fld id="{472F4B7F-6C10-4D53-A27B-CC237E91CB34}" type="datetime1">
               <a:rPr lang="pt-BR" smtClean="0"/>
-              <a:t>26/09/2011</a:t>
+              <a:t>27/9/2011</a:t>
             </a:fld>
             <a:endParaRPr lang="pt-BR" dirty="0"/>
           </a:p>
@@ -23597,7 +23611,7 @@
         <p:spPr>
           <a:xfrm>
             <a:off x="5652120" y="6525344"/>
-            <a:ext cx="2448271" cy="337195"/>
+            <a:ext cx="2952328" cy="337195"/>
           </a:xfrm>
         </p:spPr>
         <p:txBody>
@@ -23777,7 +23791,7 @@
           <a:p>
             <a:fld id="{4E9312FF-E5A5-4E7D-A855-27DC3D260262}" type="datetime1">
               <a:rPr lang="pt-BR" smtClean="0"/>
-              <a:t>26/09/2011</a:t>
+              <a:t>27/9/2011</a:t>
             </a:fld>
             <a:endParaRPr lang="pt-BR" dirty="0"/>
           </a:p>
@@ -24603,7 +24617,7 @@
           <a:p>
             <a:fld id="{54EB7FFA-AEF9-48E2-BD82-6E1E402D109F}" type="datetime1">
               <a:rPr lang="pt-BR" smtClean="0"/>
-              <a:t>26/09/2011</a:t>
+              <a:t>27/9/2011</a:t>
             </a:fld>
             <a:endParaRPr lang="pt-BR" dirty="0"/>
           </a:p>
@@ -24851,7 +24865,7 @@
           <a:p>
             <a:fld id="{357DDFA5-E5F1-43EC-996F-78DBF8B52FC6}" type="datetime1">
               <a:rPr lang="pt-BR" smtClean="0"/>
-              <a:t>26/09/2011</a:t>
+              <a:t>27/9/2011</a:t>
             </a:fld>
             <a:endParaRPr lang="pt-BR" dirty="0"/>
           </a:p>
@@ -25186,7 +25200,7 @@
           <a:p>
             <a:fld id="{61209680-2B12-4AB9-BCBC-6836D7A2D5A2}" type="datetime1">
               <a:rPr lang="pt-BR" smtClean="0"/>
-              <a:t>26/09/2011</a:t>
+              <a:t>27/9/2011</a:t>
             </a:fld>
             <a:endParaRPr lang="pt-BR" dirty="0"/>
           </a:p>
@@ -25288,7 +25302,7 @@
           <a:p>
             <a:fld id="{3F8C3AB0-901B-49F6-92CD-AD15C65D5417}" type="datetime1">
               <a:rPr lang="pt-BR" smtClean="0"/>
-              <a:t>26/09/2011</a:t>
+              <a:t>27/9/2011</a:t>
             </a:fld>
             <a:endParaRPr lang="pt-BR" dirty="0"/>
           </a:p>
@@ -25817,7 +25831,7 @@
           <a:p>
             <a:fld id="{22EC3EF7-9ED9-49E9-9BD3-95C4E33B81A6}" type="datetime1">
               <a:rPr lang="pt-BR" smtClean="0"/>
-              <a:t>26/09/2011</a:t>
+              <a:t>27/9/2011</a:t>
             </a:fld>
             <a:endParaRPr lang="pt-BR" dirty="0"/>
           </a:p>
@@ -26340,7 +26354,7 @@
           <a:p>
             <a:fld id="{9A90EF26-17C7-4334-AF48-68D474289B48}" type="datetime1">
               <a:rPr lang="pt-BR" smtClean="0"/>
-              <a:t>26/09/2011</a:t>
+              <a:t>27/9/2011</a:t>
             </a:fld>
             <a:endParaRPr lang="pt-BR" dirty="0"/>
           </a:p>
@@ -27239,15 +27253,7 @@
           <a:p>
             <a:r>
               <a:rPr lang="pt-BR" sz="1200" b="0" dirty="0" smtClean="0"/>
-              <a:t>Leonardo </a:t>
-            </a:r>
-            <a:r>
-              <a:rPr lang="pt-BR" sz="1200" b="0" dirty="0" smtClean="0"/>
-              <a:t>Antônio </a:t>
-            </a:r>
-            <a:r>
-              <a:rPr lang="pt-BR" sz="1200" b="0" dirty="0" smtClean="0"/>
-              <a:t>de Andrade – UFSCar</a:t>
+              <a:t>Leonardo Antônio de Andrade – UFSCar</a:t>
             </a:r>
           </a:p>
           <a:p>
@@ -27586,7 +27592,7 @@
         <p:spPr/>
         <p:txBody>
           <a:bodyPr>
-            <a:normAutofit/>
+            <a:normAutofit fontScale="90000"/>
           </a:bodyPr>
           <a:lstStyle/>
           <a:p>
@@ -27604,7 +27610,7 @@
       </p:sp>
       <p:sp>
         <p:nvSpPr>
-          <p:cNvPr id="7" name="Espaço Reservado para Rodapé 4"/>
+          <p:cNvPr id="8" name="Espaço Reservado para Rodapé 4"/>
           <p:cNvSpPr>
             <a:spLocks noGrp="1"/>
           </p:cNvSpPr>
@@ -27615,7 +27621,7 @@
         <p:spPr>
           <a:xfrm>
             <a:off x="5652120" y="6525344"/>
-            <a:ext cx="2448271" cy="337195"/>
+            <a:ext cx="3096344" cy="337195"/>
           </a:xfrm>
           <a:prstGeom prst="rect">
             <a:avLst/>
@@ -28169,129 +28175,6 @@
       </p:sp>
       <p:sp>
         <p:nvSpPr>
-          <p:cNvPr id="11" name="Espaço Reservado para Rodapé 3"/>
-          <p:cNvSpPr txBox="1">
-            <a:spLocks/>
-          </p:cNvSpPr>
-          <p:nvPr/>
-        </p:nvSpPr>
-        <p:spPr>
-          <a:xfrm>
-            <a:off x="4211960" y="6492240"/>
-            <a:ext cx="4536504" cy="365760"/>
-          </a:xfrm>
-          <a:prstGeom prst="rect">
-            <a:avLst/>
-          </a:prstGeom>
-        </p:spPr>
-        <p:txBody>
-          <a:bodyPr vert="horz" anchor="ctr" anchorCtr="0"/>
-          <a:lstStyle>
-            <a:defPPr>
-              <a:defRPr lang="pt-BR"/>
-            </a:defPPr>
-            <a:lvl1pPr marL="0" algn="l" defTabSz="914400" rtl="0" eaLnBrk="1" latinLnBrk="0" hangingPunct="1">
-              <a:defRPr kumimoji="0" sz="1200" kern="1200">
-                <a:solidFill>
-                  <a:schemeClr val="tx2"/>
-                </a:solidFill>
-                <a:latin typeface="+mn-lt"/>
-                <a:ea typeface="+mn-ea"/>
-                <a:cs typeface="+mn-cs"/>
-              </a:defRPr>
-            </a:lvl1pPr>
-            <a:lvl2pPr marL="457200" algn="l" defTabSz="914400" rtl="0" eaLnBrk="1" latinLnBrk="0" hangingPunct="1">
-              <a:defRPr sz="1800" kern="1200">
-                <a:solidFill>
-                  <a:schemeClr val="tx1"/>
-                </a:solidFill>
-                <a:latin typeface="+mn-lt"/>
-                <a:ea typeface="+mn-ea"/>
-                <a:cs typeface="+mn-cs"/>
-              </a:defRPr>
-            </a:lvl2pPr>
-            <a:lvl3pPr marL="914400" algn="l" defTabSz="914400" rtl="0" eaLnBrk="1" latinLnBrk="0" hangingPunct="1">
-              <a:defRPr sz="1800" kern="1200">
-                <a:solidFill>
-                  <a:schemeClr val="tx1"/>
-                </a:solidFill>
-                <a:latin typeface="+mn-lt"/>
-                <a:ea typeface="+mn-ea"/>
-                <a:cs typeface="+mn-cs"/>
-              </a:defRPr>
-            </a:lvl3pPr>
-            <a:lvl4pPr marL="1371600" algn="l" defTabSz="914400" rtl="0" eaLnBrk="1" latinLnBrk="0" hangingPunct="1">
-              <a:defRPr sz="1800" kern="1200">
-                <a:solidFill>
-                  <a:schemeClr val="tx1"/>
-                </a:solidFill>
-                <a:latin typeface="+mn-lt"/>
-                <a:ea typeface="+mn-ea"/>
-                <a:cs typeface="+mn-cs"/>
-              </a:defRPr>
-            </a:lvl4pPr>
-            <a:lvl5pPr marL="1828800" algn="l" defTabSz="914400" rtl="0" eaLnBrk="1" latinLnBrk="0" hangingPunct="1">
-              <a:defRPr sz="1800" kern="1200">
-                <a:solidFill>
-                  <a:schemeClr val="tx1"/>
-                </a:solidFill>
-                <a:latin typeface="+mn-lt"/>
-                <a:ea typeface="+mn-ea"/>
-                <a:cs typeface="+mn-cs"/>
-              </a:defRPr>
-            </a:lvl5pPr>
-            <a:lvl6pPr marL="2286000" algn="l" defTabSz="914400" rtl="0" eaLnBrk="1" latinLnBrk="0" hangingPunct="1">
-              <a:defRPr sz="1800" kern="1200">
-                <a:solidFill>
-                  <a:schemeClr val="tx1"/>
-                </a:solidFill>
-                <a:latin typeface="+mn-lt"/>
-                <a:ea typeface="+mn-ea"/>
-                <a:cs typeface="+mn-cs"/>
-              </a:defRPr>
-            </a:lvl6pPr>
-            <a:lvl7pPr marL="2743200" algn="l" defTabSz="914400" rtl="0" eaLnBrk="1" latinLnBrk="0" hangingPunct="1">
-              <a:defRPr sz="1800" kern="1200">
-                <a:solidFill>
-                  <a:schemeClr val="tx1"/>
-                </a:solidFill>
-                <a:latin typeface="+mn-lt"/>
-                <a:ea typeface="+mn-ea"/>
-                <a:cs typeface="+mn-cs"/>
-              </a:defRPr>
-            </a:lvl7pPr>
-            <a:lvl8pPr marL="3200400" algn="l" defTabSz="914400" rtl="0" eaLnBrk="1" latinLnBrk="0" hangingPunct="1">
-              <a:defRPr sz="1800" kern="1200">
-                <a:solidFill>
-                  <a:schemeClr val="tx1"/>
-                </a:solidFill>
-                <a:latin typeface="+mn-lt"/>
-                <a:ea typeface="+mn-ea"/>
-                <a:cs typeface="+mn-cs"/>
-              </a:defRPr>
-            </a:lvl8pPr>
-            <a:lvl9pPr marL="3657600" algn="l" defTabSz="914400" rtl="0" eaLnBrk="1" latinLnBrk="0" hangingPunct="1">
-              <a:defRPr sz="1800" kern="1200">
-                <a:solidFill>
-                  <a:schemeClr val="tx1"/>
-                </a:solidFill>
-                <a:latin typeface="+mn-lt"/>
-                <a:ea typeface="+mn-ea"/>
-                <a:cs typeface="+mn-cs"/>
-              </a:defRPr>
-            </a:lvl9pPr>
-          </a:lstStyle>
-          <a:p>
-            <a:r>
-              <a:rPr lang="pt-BR" dirty="0" smtClean="0"/>
-              <a:t>Qualificação Mestrado – Matheus Ricardo Uihara Zingarelli</a:t>
-            </a:r>
-            <a:endParaRPr lang="pt-BR" dirty="0"/>
-          </a:p>
-        </p:txBody>
-      </p:sp>
-      <p:sp>
-        <p:nvSpPr>
           <p:cNvPr id="4" name="Espaço Reservado para Conteúdo 3"/>
           <p:cNvSpPr>
             <a:spLocks noGrp="1"/>
@@ -28379,6 +28262,34 @@
                 <a:srgbClr val="FFFFFF"/>
               </a:solidFill>
             </a:endParaRPr>
+          </a:p>
+        </p:txBody>
+      </p:sp>
+      <p:sp>
+        <p:nvSpPr>
+          <p:cNvPr id="8" name="Espaço Reservado para Rodapé 4"/>
+          <p:cNvSpPr>
+            <a:spLocks noGrp="1"/>
+          </p:cNvSpPr>
+          <p:nvPr>
+            <p:ph type="ftr" sz="quarter" idx="16"/>
+          </p:nvPr>
+        </p:nvSpPr>
+        <p:spPr>
+          <a:xfrm>
+            <a:off x="5652120" y="6525344"/>
+            <a:ext cx="2952328" cy="337195"/>
+          </a:xfrm>
+        </p:spPr>
+        <p:txBody>
+          <a:bodyPr/>
+          <a:lstStyle/>
+          <a:p>
+            <a:r>
+              <a:rPr lang="pt-BR" dirty="0" smtClean="0"/>
+              <a:t>XVII WebMedia – Outubro/2011</a:t>
+            </a:r>
+            <a:endParaRPr lang="pt-BR" dirty="0"/>
           </a:p>
         </p:txBody>
       </p:sp>
@@ -28484,129 +28395,6 @@
                 <a:srgbClr val="FFFFFF"/>
               </a:solidFill>
             </a:endParaRPr>
-          </a:p>
-        </p:txBody>
-      </p:sp>
-      <p:sp>
-        <p:nvSpPr>
-          <p:cNvPr id="11" name="Espaço Reservado para Rodapé 3"/>
-          <p:cNvSpPr txBox="1">
-            <a:spLocks/>
-          </p:cNvSpPr>
-          <p:nvPr/>
-        </p:nvSpPr>
-        <p:spPr>
-          <a:xfrm>
-            <a:off x="4211960" y="6492240"/>
-            <a:ext cx="4536504" cy="365760"/>
-          </a:xfrm>
-          <a:prstGeom prst="rect">
-            <a:avLst/>
-          </a:prstGeom>
-        </p:spPr>
-        <p:txBody>
-          <a:bodyPr vert="horz" anchor="ctr" anchorCtr="0"/>
-          <a:lstStyle>
-            <a:defPPr>
-              <a:defRPr lang="pt-BR"/>
-            </a:defPPr>
-            <a:lvl1pPr marL="0" algn="l" defTabSz="914400" rtl="0" eaLnBrk="1" latinLnBrk="0" hangingPunct="1">
-              <a:defRPr kumimoji="0" sz="1200" kern="1200">
-                <a:solidFill>
-                  <a:schemeClr val="tx2"/>
-                </a:solidFill>
-                <a:latin typeface="+mn-lt"/>
-                <a:ea typeface="+mn-ea"/>
-                <a:cs typeface="+mn-cs"/>
-              </a:defRPr>
-            </a:lvl1pPr>
-            <a:lvl2pPr marL="457200" algn="l" defTabSz="914400" rtl="0" eaLnBrk="1" latinLnBrk="0" hangingPunct="1">
-              <a:defRPr sz="1800" kern="1200">
-                <a:solidFill>
-                  <a:schemeClr val="tx1"/>
-                </a:solidFill>
-                <a:latin typeface="+mn-lt"/>
-                <a:ea typeface="+mn-ea"/>
-                <a:cs typeface="+mn-cs"/>
-              </a:defRPr>
-            </a:lvl2pPr>
-            <a:lvl3pPr marL="914400" algn="l" defTabSz="914400" rtl="0" eaLnBrk="1" latinLnBrk="0" hangingPunct="1">
-              <a:defRPr sz="1800" kern="1200">
-                <a:solidFill>
-                  <a:schemeClr val="tx1"/>
-                </a:solidFill>
-                <a:latin typeface="+mn-lt"/>
-                <a:ea typeface="+mn-ea"/>
-                <a:cs typeface="+mn-cs"/>
-              </a:defRPr>
-            </a:lvl3pPr>
-            <a:lvl4pPr marL="1371600" algn="l" defTabSz="914400" rtl="0" eaLnBrk="1" latinLnBrk="0" hangingPunct="1">
-              <a:defRPr sz="1800" kern="1200">
-                <a:solidFill>
-                  <a:schemeClr val="tx1"/>
-                </a:solidFill>
-                <a:latin typeface="+mn-lt"/>
-                <a:ea typeface="+mn-ea"/>
-                <a:cs typeface="+mn-cs"/>
-              </a:defRPr>
-            </a:lvl4pPr>
-            <a:lvl5pPr marL="1828800" algn="l" defTabSz="914400" rtl="0" eaLnBrk="1" latinLnBrk="0" hangingPunct="1">
-              <a:defRPr sz="1800" kern="1200">
-                <a:solidFill>
-                  <a:schemeClr val="tx1"/>
-                </a:solidFill>
-                <a:latin typeface="+mn-lt"/>
-                <a:ea typeface="+mn-ea"/>
-                <a:cs typeface="+mn-cs"/>
-              </a:defRPr>
-            </a:lvl5pPr>
-            <a:lvl6pPr marL="2286000" algn="l" defTabSz="914400" rtl="0" eaLnBrk="1" latinLnBrk="0" hangingPunct="1">
-              <a:defRPr sz="1800" kern="1200">
-                <a:solidFill>
-                  <a:schemeClr val="tx1"/>
-                </a:solidFill>
-                <a:latin typeface="+mn-lt"/>
-                <a:ea typeface="+mn-ea"/>
-                <a:cs typeface="+mn-cs"/>
-              </a:defRPr>
-            </a:lvl6pPr>
-            <a:lvl7pPr marL="2743200" algn="l" defTabSz="914400" rtl="0" eaLnBrk="1" latinLnBrk="0" hangingPunct="1">
-              <a:defRPr sz="1800" kern="1200">
-                <a:solidFill>
-                  <a:schemeClr val="tx1"/>
-                </a:solidFill>
-                <a:latin typeface="+mn-lt"/>
-                <a:ea typeface="+mn-ea"/>
-                <a:cs typeface="+mn-cs"/>
-              </a:defRPr>
-            </a:lvl7pPr>
-            <a:lvl8pPr marL="3200400" algn="l" defTabSz="914400" rtl="0" eaLnBrk="1" latinLnBrk="0" hangingPunct="1">
-              <a:defRPr sz="1800" kern="1200">
-                <a:solidFill>
-                  <a:schemeClr val="tx1"/>
-                </a:solidFill>
-                <a:latin typeface="+mn-lt"/>
-                <a:ea typeface="+mn-ea"/>
-                <a:cs typeface="+mn-cs"/>
-              </a:defRPr>
-            </a:lvl8pPr>
-            <a:lvl9pPr marL="3657600" algn="l" defTabSz="914400" rtl="0" eaLnBrk="1" latinLnBrk="0" hangingPunct="1">
-              <a:defRPr sz="1800" kern="1200">
-                <a:solidFill>
-                  <a:schemeClr val="tx1"/>
-                </a:solidFill>
-                <a:latin typeface="+mn-lt"/>
-                <a:ea typeface="+mn-ea"/>
-                <a:cs typeface="+mn-cs"/>
-              </a:defRPr>
-            </a:lvl9pPr>
-          </a:lstStyle>
-          <a:p>
-            <a:r>
-              <a:rPr lang="pt-BR" dirty="0" smtClean="0"/>
-              <a:t>Qualificação Mestrado – Matheus Ricardo Uihara Zingarelli</a:t>
-            </a:r>
-            <a:endParaRPr lang="pt-BR" dirty="0"/>
           </a:p>
         </p:txBody>
       </p:sp>
@@ -28710,6 +28498,34 @@
           </a:extLst>
         </p:spPr>
       </p:pic>
+      <p:sp>
+        <p:nvSpPr>
+          <p:cNvPr id="8" name="Espaço Reservado para Rodapé 4"/>
+          <p:cNvSpPr>
+            <a:spLocks noGrp="1"/>
+          </p:cNvSpPr>
+          <p:nvPr>
+            <p:ph type="ftr" sz="quarter" idx="16"/>
+          </p:nvPr>
+        </p:nvSpPr>
+        <p:spPr>
+          <a:xfrm>
+            <a:off x="5652120" y="6525344"/>
+            <a:ext cx="2952328" cy="337195"/>
+          </a:xfrm>
+        </p:spPr>
+        <p:txBody>
+          <a:bodyPr/>
+          <a:lstStyle/>
+          <a:p>
+            <a:r>
+              <a:rPr lang="pt-BR" dirty="0" smtClean="0"/>
+              <a:t>XVII WebMedia – Outubro/2011</a:t>
+            </a:r>
+            <a:endParaRPr lang="pt-BR" dirty="0"/>
+          </a:p>
+        </p:txBody>
+      </p:sp>
     </p:spTree>
     <p:extLst>
       <p:ext uri="{BB962C8B-B14F-4D97-AF65-F5344CB8AC3E}">
@@ -28825,7 +28641,6 @@
               <a:rPr lang="en-US" sz="4400" b="0" dirty="0"/>
               <a:t>Experiments &amp; Results</a:t>
             </a:r>
-            <a:endParaRPr lang="en-US" sz="4400" b="0" dirty="0"/>
           </a:p>
         </p:txBody>
       </p:sp>
@@ -28873,7 +28688,7 @@
       </p:sp>
       <p:sp>
         <p:nvSpPr>
-          <p:cNvPr id="8" name="Espaço Reservado para Rodapé 4"/>
+          <p:cNvPr id="7" name="Espaço Reservado para Rodapé 4"/>
           <p:cNvSpPr>
             <a:spLocks noGrp="1"/>
           </p:cNvSpPr>
@@ -28884,7 +28699,7 @@
         <p:spPr>
           <a:xfrm>
             <a:off x="5652120" y="6525344"/>
-            <a:ext cx="2448271" cy="337195"/>
+            <a:ext cx="3096344" cy="337195"/>
           </a:xfrm>
           <a:prstGeom prst="rect">
             <a:avLst/>
@@ -29419,7 +29234,7 @@
       </p:sp>
       <p:sp>
         <p:nvSpPr>
-          <p:cNvPr id="9" name="Espaço Reservado para Rodapé 4"/>
+          <p:cNvPr id="7" name="Espaço Reservado para Rodapé 4"/>
           <p:cNvSpPr>
             <a:spLocks noGrp="1"/>
           </p:cNvSpPr>
@@ -29430,7 +29245,7 @@
         <p:spPr>
           <a:xfrm>
             <a:off x="5652120" y="6525344"/>
-            <a:ext cx="2448271" cy="337195"/>
+            <a:ext cx="3096344" cy="337195"/>
           </a:xfrm>
           <a:prstGeom prst="rect">
             <a:avLst/>
@@ -29755,8 +29570,24 @@
             <a:pPr lvl="1"/>
             <a:r>
               <a:rPr lang="en-US" dirty="0" smtClean="0"/>
-              <a:t>Compression and quality</a:t>
+              <a:t>Compatibility</a:t>
             </a:r>
+          </a:p>
+          <a:p>
+            <a:pPr lvl="1"/>
+            <a:r>
+              <a:rPr lang="en-US" dirty="0" smtClean="0"/>
+              <a:t>Compression </a:t>
+            </a:r>
+            <a:r>
+              <a:rPr lang="en-US" dirty="0" smtClean="0"/>
+              <a:t>and </a:t>
+            </a:r>
+            <a:r>
+              <a:rPr lang="en-US" dirty="0" smtClean="0"/>
+              <a:t>quality</a:t>
+            </a:r>
+            <a:endParaRPr lang="en-US" dirty="0" smtClean="0"/>
           </a:p>
           <a:p>
             <a:pPr lvl="1"/>
@@ -29903,129 +29734,6 @@
           </a:p>
         </p:txBody>
       </p:sp>
-      <p:sp>
-        <p:nvSpPr>
-          <p:cNvPr id="11" name="Espaço Reservado para Rodapé 3"/>
-          <p:cNvSpPr txBox="1">
-            <a:spLocks/>
-          </p:cNvSpPr>
-          <p:nvPr/>
-        </p:nvSpPr>
-        <p:spPr>
-          <a:xfrm>
-            <a:off x="4211960" y="6492240"/>
-            <a:ext cx="4536504" cy="365760"/>
-          </a:xfrm>
-          <a:prstGeom prst="rect">
-            <a:avLst/>
-          </a:prstGeom>
-        </p:spPr>
-        <p:txBody>
-          <a:bodyPr vert="horz" anchor="ctr" anchorCtr="0"/>
-          <a:lstStyle>
-            <a:defPPr>
-              <a:defRPr lang="pt-BR"/>
-            </a:defPPr>
-            <a:lvl1pPr marL="0" algn="l" defTabSz="914400" rtl="0" eaLnBrk="1" latinLnBrk="0" hangingPunct="1">
-              <a:defRPr kumimoji="0" sz="1200" kern="1200">
-                <a:solidFill>
-                  <a:schemeClr val="tx2"/>
-                </a:solidFill>
-                <a:latin typeface="+mn-lt"/>
-                <a:ea typeface="+mn-ea"/>
-                <a:cs typeface="+mn-cs"/>
-              </a:defRPr>
-            </a:lvl1pPr>
-            <a:lvl2pPr marL="457200" algn="l" defTabSz="914400" rtl="0" eaLnBrk="1" latinLnBrk="0" hangingPunct="1">
-              <a:defRPr sz="1800" kern="1200">
-                <a:solidFill>
-                  <a:schemeClr val="tx1"/>
-                </a:solidFill>
-                <a:latin typeface="+mn-lt"/>
-                <a:ea typeface="+mn-ea"/>
-                <a:cs typeface="+mn-cs"/>
-              </a:defRPr>
-            </a:lvl2pPr>
-            <a:lvl3pPr marL="914400" algn="l" defTabSz="914400" rtl="0" eaLnBrk="1" latinLnBrk="0" hangingPunct="1">
-              <a:defRPr sz="1800" kern="1200">
-                <a:solidFill>
-                  <a:schemeClr val="tx1"/>
-                </a:solidFill>
-                <a:latin typeface="+mn-lt"/>
-                <a:ea typeface="+mn-ea"/>
-                <a:cs typeface="+mn-cs"/>
-              </a:defRPr>
-            </a:lvl3pPr>
-            <a:lvl4pPr marL="1371600" algn="l" defTabSz="914400" rtl="0" eaLnBrk="1" latinLnBrk="0" hangingPunct="1">
-              <a:defRPr sz="1800" kern="1200">
-                <a:solidFill>
-                  <a:schemeClr val="tx1"/>
-                </a:solidFill>
-                <a:latin typeface="+mn-lt"/>
-                <a:ea typeface="+mn-ea"/>
-                <a:cs typeface="+mn-cs"/>
-              </a:defRPr>
-            </a:lvl4pPr>
-            <a:lvl5pPr marL="1828800" algn="l" defTabSz="914400" rtl="0" eaLnBrk="1" latinLnBrk="0" hangingPunct="1">
-              <a:defRPr sz="1800" kern="1200">
-                <a:solidFill>
-                  <a:schemeClr val="tx1"/>
-                </a:solidFill>
-                <a:latin typeface="+mn-lt"/>
-                <a:ea typeface="+mn-ea"/>
-                <a:cs typeface="+mn-cs"/>
-              </a:defRPr>
-            </a:lvl5pPr>
-            <a:lvl6pPr marL="2286000" algn="l" defTabSz="914400" rtl="0" eaLnBrk="1" latinLnBrk="0" hangingPunct="1">
-              <a:defRPr sz="1800" kern="1200">
-                <a:solidFill>
-                  <a:schemeClr val="tx1"/>
-                </a:solidFill>
-                <a:latin typeface="+mn-lt"/>
-                <a:ea typeface="+mn-ea"/>
-                <a:cs typeface="+mn-cs"/>
-              </a:defRPr>
-            </a:lvl6pPr>
-            <a:lvl7pPr marL="2743200" algn="l" defTabSz="914400" rtl="0" eaLnBrk="1" latinLnBrk="0" hangingPunct="1">
-              <a:defRPr sz="1800" kern="1200">
-                <a:solidFill>
-                  <a:schemeClr val="tx1"/>
-                </a:solidFill>
-                <a:latin typeface="+mn-lt"/>
-                <a:ea typeface="+mn-ea"/>
-                <a:cs typeface="+mn-cs"/>
-              </a:defRPr>
-            </a:lvl7pPr>
-            <a:lvl8pPr marL="3200400" algn="l" defTabSz="914400" rtl="0" eaLnBrk="1" latinLnBrk="0" hangingPunct="1">
-              <a:defRPr sz="1800" kern="1200">
-                <a:solidFill>
-                  <a:schemeClr val="tx1"/>
-                </a:solidFill>
-                <a:latin typeface="+mn-lt"/>
-                <a:ea typeface="+mn-ea"/>
-                <a:cs typeface="+mn-cs"/>
-              </a:defRPr>
-            </a:lvl8pPr>
-            <a:lvl9pPr marL="3657600" algn="l" defTabSz="914400" rtl="0" eaLnBrk="1" latinLnBrk="0" hangingPunct="1">
-              <a:defRPr sz="1800" kern="1200">
-                <a:solidFill>
-                  <a:schemeClr val="tx1"/>
-                </a:solidFill>
-                <a:latin typeface="+mn-lt"/>
-                <a:ea typeface="+mn-ea"/>
-                <a:cs typeface="+mn-cs"/>
-              </a:defRPr>
-            </a:lvl9pPr>
-          </a:lstStyle>
-          <a:p>
-            <a:r>
-              <a:rPr lang="pt-BR" dirty="0" smtClean="0"/>
-              <a:t>Qualificação Mestrado – Matheus Ricardo Uihara Zingarelli</a:t>
-            </a:r>
-            <a:endParaRPr lang="pt-BR" dirty="0"/>
-          </a:p>
-        </p:txBody>
-      </p:sp>
       <p:pic>
         <p:nvPicPr>
           <p:cNvPr id="8" name="Picture 2" descr="E:\versionados\1-Meus-Artigos\Qualificacao\imagens\rv05-reversed.png"/>
@@ -30065,6 +29773,34 @@
           </a:extLst>
         </p:spPr>
       </p:pic>
+      <p:sp>
+        <p:nvSpPr>
+          <p:cNvPr id="6" name="Espaço Reservado para Rodapé 4"/>
+          <p:cNvSpPr>
+            <a:spLocks noGrp="1"/>
+          </p:cNvSpPr>
+          <p:nvPr>
+            <p:ph type="ftr" sz="quarter" idx="16"/>
+          </p:nvPr>
+        </p:nvSpPr>
+        <p:spPr>
+          <a:xfrm>
+            <a:off x="5652120" y="6525344"/>
+            <a:ext cx="2952328" cy="337195"/>
+          </a:xfrm>
+        </p:spPr>
+        <p:txBody>
+          <a:bodyPr/>
+          <a:lstStyle/>
+          <a:p>
+            <a:r>
+              <a:rPr lang="pt-BR" dirty="0" smtClean="0"/>
+              <a:t>XVII WebMedia – Outubro/2011</a:t>
+            </a:r>
+            <a:endParaRPr lang="pt-BR" dirty="0"/>
+          </a:p>
+        </p:txBody>
+      </p:sp>
       <p:pic>
         <p:nvPicPr>
           <p:cNvPr id="10" name="Picture 2" descr="E:\versionados\1-Meus-Artigos\Qualificacao\imagens\rv05-reversed.png"/>
@@ -30269,7 +30005,7 @@
       </p:sp>
       <p:sp>
         <p:nvSpPr>
-          <p:cNvPr id="8" name="Espaço Reservado para Rodapé 4"/>
+          <p:cNvPr id="7" name="Espaço Reservado para Rodapé 4"/>
           <p:cNvSpPr>
             <a:spLocks noGrp="1"/>
           </p:cNvSpPr>
@@ -30280,7 +30016,7 @@
         <p:spPr>
           <a:xfrm>
             <a:off x="5652120" y="6525344"/>
-            <a:ext cx="2448271" cy="337195"/>
+            <a:ext cx="3096344" cy="337195"/>
           </a:xfrm>
           <a:prstGeom prst="rect">
             <a:avLst/>
@@ -30374,7 +30110,7 @@
         <p:spPr>
           <a:xfrm>
             <a:off x="457200" y="1600200"/>
-            <a:ext cx="7467600" cy="4997152"/>
+            <a:ext cx="7467600" cy="4565104"/>
           </a:xfrm>
         </p:spPr>
         <p:txBody>
@@ -30384,283 +30120,157 @@
           <a:lstStyle/>
           <a:p>
             <a:r>
-              <a:rPr lang="pt-BR" sz="1400" dirty="0"/>
+              <a:rPr lang="pt-BR" sz="1600" dirty="0"/>
               <a:t>[1]   Andrade, L., Dolosic, P., Goularte, R. 2010. Construção de </a:t>
             </a:r>
             <a:r>
-              <a:rPr lang="pt-BR" sz="1400" dirty="0" smtClean="0"/>
+              <a:rPr lang="pt-BR" sz="1600" dirty="0" smtClean="0"/>
               <a:t>uma </a:t>
             </a:r>
             <a:r>
-              <a:rPr lang="pt-BR" sz="1400" dirty="0"/>
+              <a:rPr lang="pt-BR" sz="1600" dirty="0"/>
               <a:t>Base de Vídeos Estereoscópicos. Technical Report. </a:t>
             </a:r>
             <a:r>
-              <a:rPr lang="pt-BR" sz="1400" dirty="0" smtClean="0"/>
+              <a:rPr lang="pt-BR" sz="1600" dirty="0" smtClean="0"/>
               <a:t>ICMC-University </a:t>
             </a:r>
             <a:r>
-              <a:rPr lang="pt-BR" sz="1400" dirty="0"/>
+              <a:rPr lang="pt-BR" sz="1600" dirty="0"/>
               <a:t>of São Paulo, São Paulo, Brazil. Available </a:t>
             </a:r>
             <a:r>
-              <a:rPr lang="pt-BR" sz="1400" dirty="0" smtClean="0"/>
+              <a:rPr lang="pt-BR" sz="1600" dirty="0" smtClean="0"/>
               <a:t>at </a:t>
             </a:r>
             <a:r>
-              <a:rPr lang="pt-BR" sz="1400" dirty="0" smtClean="0">
+              <a:rPr lang="pt-BR" sz="1600" dirty="0" smtClean="0">
                 <a:hlinkClick r:id="rId2"/>
               </a:rPr>
               <a:t>http</a:t>
             </a:r>
             <a:r>
-              <a:rPr lang="pt-BR" sz="1400" dirty="0">
+              <a:rPr lang="pt-BR" sz="1600" dirty="0">
                 <a:hlinkClick r:id="rId2"/>
               </a:rPr>
               <a:t>://www.icmc.usp.br/~</a:t>
             </a:r>
             <a:r>
-              <a:rPr lang="pt-BR" sz="1400" dirty="0" smtClean="0">
+              <a:rPr lang="pt-BR" sz="1600" dirty="0" smtClean="0">
                 <a:hlinkClick r:id="rId2"/>
               </a:rPr>
               <a:t>biblio/BIBLIOTECA/rel_tec/RT_351.pdf</a:t>
             </a:r>
-            <a:endParaRPr lang="pt-BR" sz="1400" dirty="0" smtClean="0"/>
-          </a:p>
-          <a:p>
-            <a:endParaRPr lang="pt-BR" sz="1400" dirty="0" smtClean="0"/>
+            <a:endParaRPr lang="pt-BR" sz="1600" dirty="0" smtClean="0"/>
+          </a:p>
+          <a:p>
+            <a:endParaRPr lang="pt-BR" sz="1600" dirty="0" smtClean="0"/>
           </a:p>
           <a:p>
             <a:r>
-              <a:rPr lang="pt-BR" sz="1400" dirty="0" smtClean="0"/>
+              <a:rPr lang="pt-BR" sz="1600" dirty="0" smtClean="0"/>
               <a:t>[</a:t>
             </a:r>
             <a:r>
-              <a:rPr lang="pt-BR" sz="1400" dirty="0"/>
+              <a:rPr lang="pt-BR" sz="1600" dirty="0"/>
               <a:t>2]   Andrade, L. A., Goularte, R. 2009. Anaglyphic stereoscopic </a:t>
             </a:r>
             <a:r>
-              <a:rPr lang="pt-BR" sz="1400" dirty="0" smtClean="0"/>
+              <a:rPr lang="pt-BR" sz="1600" dirty="0" smtClean="0"/>
               <a:t>perception </a:t>
             </a:r>
             <a:r>
-              <a:rPr lang="pt-BR" sz="1400" dirty="0"/>
+              <a:rPr lang="pt-BR" sz="1600" dirty="0"/>
               <a:t>on lossy compressed digital videos. In </a:t>
             </a:r>
             <a:r>
-              <a:rPr lang="pt-BR" sz="1400" dirty="0" smtClean="0"/>
+              <a:rPr lang="pt-BR" sz="1600" dirty="0" smtClean="0"/>
               <a:t>Proceedings </a:t>
             </a:r>
             <a:r>
-              <a:rPr lang="pt-BR" sz="1400" dirty="0"/>
+              <a:rPr lang="pt-BR" sz="1600" dirty="0"/>
               <a:t>of the XV Brazilian Symposium on </a:t>
             </a:r>
             <a:r>
-              <a:rPr lang="pt-BR" sz="1400" dirty="0" smtClean="0"/>
+              <a:rPr lang="pt-BR" sz="1600" dirty="0" smtClean="0"/>
               <a:t>Multimedia and </a:t>
             </a:r>
             <a:r>
-              <a:rPr lang="pt-BR" sz="1400" dirty="0"/>
+              <a:rPr lang="pt-BR" sz="1600" dirty="0"/>
               <a:t>the Web (WebMedia '09). Fortaleza, v.1, n.1, 226-233. </a:t>
             </a:r>
             <a:r>
-              <a:rPr lang="pt-BR" sz="1400" dirty="0" smtClean="0"/>
+              <a:rPr lang="pt-BR" sz="1600" dirty="0" smtClean="0"/>
               <a:t>DOI=</a:t>
             </a:r>
             <a:r>
-              <a:rPr lang="pt-BR" sz="1400" dirty="0" smtClean="0">
+              <a:rPr lang="pt-BR" sz="1600" dirty="0" smtClean="0">
                 <a:hlinkClick r:id="rId3"/>
               </a:rPr>
               <a:t>http</a:t>
             </a:r>
             <a:r>
-              <a:rPr lang="pt-BR" sz="1400" dirty="0">
+              <a:rPr lang="pt-BR" sz="1600" dirty="0">
                 <a:hlinkClick r:id="rId3"/>
               </a:rPr>
               <a:t>://</a:t>
             </a:r>
             <a:r>
-              <a:rPr lang="pt-BR" sz="1400" dirty="0" smtClean="0">
+              <a:rPr lang="pt-BR" sz="1600" dirty="0" smtClean="0">
                 <a:hlinkClick r:id="rId3"/>
               </a:rPr>
               <a:t>doi.acm.org/10.1145/1858477.1858506</a:t>
             </a:r>
             <a:r>
-              <a:rPr lang="pt-BR" sz="1400" dirty="0" smtClean="0"/>
+              <a:rPr lang="pt-BR" sz="1600" dirty="0" smtClean="0"/>
               <a:t>. </a:t>
             </a:r>
           </a:p>
           <a:p>
-            <a:endParaRPr lang="pt-BR" sz="1400" dirty="0"/>
+            <a:endParaRPr lang="pt-BR" sz="1600" dirty="0"/>
           </a:p>
           <a:p>
             <a:r>
-              <a:rPr lang="pt-BR" sz="1400" dirty="0"/>
+              <a:rPr lang="pt-BR" sz="1600" dirty="0"/>
               <a:t>[3]   Andrade, L. A., Goularte, R. 2010. Uma Análise da </a:t>
             </a:r>
             <a:r>
-              <a:rPr lang="pt-BR" sz="1400" dirty="0" smtClean="0"/>
+              <a:rPr lang="pt-BR" sz="1600" dirty="0" smtClean="0"/>
               <a:t>Influência </a:t>
             </a:r>
             <a:r>
-              <a:rPr lang="pt-BR" sz="1400" dirty="0"/>
+              <a:rPr lang="pt-BR" sz="1600" dirty="0"/>
               <a:t>da Subamostragem de Crominância em Vídeos </a:t>
             </a:r>
             <a:r>
-              <a:rPr lang="pt-BR" sz="1400" dirty="0" smtClean="0"/>
+              <a:rPr lang="pt-BR" sz="1600" dirty="0" smtClean="0"/>
               <a:t>Estereoscópicos </a:t>
             </a:r>
             <a:r>
-              <a:rPr lang="pt-BR" sz="1400" dirty="0"/>
+              <a:rPr lang="pt-BR" sz="1600" dirty="0"/>
               <a:t>Anaglíficos. In Proceedings of the XVI </a:t>
             </a:r>
             <a:r>
-              <a:rPr lang="pt-BR" sz="1400" dirty="0" smtClean="0"/>
+              <a:rPr lang="pt-BR" sz="1600" dirty="0" smtClean="0"/>
               <a:t>Brazilian </a:t>
             </a:r>
             <a:r>
-              <a:rPr lang="pt-BR" sz="1400" dirty="0"/>
+              <a:rPr lang="pt-BR" sz="1600" dirty="0"/>
               <a:t>Symposium on Multimedia and the </a:t>
             </a:r>
             <a:r>
-              <a:rPr lang="pt-BR" sz="1400" dirty="0" smtClean="0"/>
+              <a:rPr lang="pt-BR" sz="1600" dirty="0" smtClean="0"/>
               <a:t>Web (WebMedia </a:t>
             </a:r>
             <a:r>
-              <a:rPr lang="pt-BR" sz="1400" dirty="0"/>
+              <a:rPr lang="pt-BR" sz="1600" dirty="0"/>
               <a:t>'10</a:t>
             </a:r>
             <a:r>
-              <a:rPr lang="pt-BR" sz="1400" dirty="0" smtClean="0"/>
+              <a:rPr lang="pt-BR" sz="1600" dirty="0" smtClean="0"/>
               <a:t>).</a:t>
             </a:r>
-          </a:p>
-          <a:p>
-            <a:endParaRPr lang="pt-BR" sz="1400" dirty="0" smtClean="0"/>
-          </a:p>
-          <a:p>
-            <a:r>
-              <a:rPr lang="pt-BR" sz="1400" dirty="0" smtClean="0"/>
-              <a:t>[4] </a:t>
-            </a:r>
-            <a:r>
-              <a:rPr lang="en-US" sz="1400" dirty="0"/>
-              <a:t>Smolic, A.; Mueller, K.; Merkle, P.; Kauff, P.; Wiegand, T. </a:t>
-            </a:r>
-            <a:r>
-              <a:rPr lang="en-US" sz="1400" dirty="0" smtClean="0"/>
-              <a:t>2009</a:t>
-            </a:r>
-            <a:r>
-              <a:rPr lang="en-US" sz="1400" dirty="0"/>
-              <a:t>. An Overview of Available and Emerging 3D Video </a:t>
-            </a:r>
-            <a:r>
-              <a:rPr lang="en-US" sz="1400" dirty="0" smtClean="0"/>
-              <a:t>Formats </a:t>
-            </a:r>
-            <a:r>
-              <a:rPr lang="en-US" sz="1400" dirty="0"/>
-              <a:t>and Depth Enhanced Stereo as Efficient Generic </a:t>
-            </a:r>
-            <a:r>
-              <a:rPr lang="en-US" sz="1400" dirty="0" smtClean="0"/>
-              <a:t>Solution</a:t>
-            </a:r>
-            <a:r>
-              <a:rPr lang="en-US" sz="1400" dirty="0"/>
-              <a:t>. Proceedings of the 27th conference on Picture </a:t>
-            </a:r>
-            <a:r>
-              <a:rPr lang="en-US" sz="1400" dirty="0" smtClean="0"/>
-              <a:t>Coding </a:t>
-            </a:r>
-            <a:r>
-              <a:rPr lang="en-US" sz="1400" dirty="0"/>
-              <a:t>Symposium, 2009 (May, 2009), 1-4, 6-8. </a:t>
-            </a:r>
-            <a:r>
-              <a:rPr lang="en-US" sz="1400" dirty="0" smtClean="0"/>
-              <a:t>DOI=</a:t>
-            </a:r>
-            <a:r>
-              <a:rPr lang="en-US" sz="1400" dirty="0" smtClean="0">
-                <a:hlinkClick r:id="rId4"/>
-              </a:rPr>
-              <a:t>http</a:t>
-            </a:r>
-            <a:r>
-              <a:rPr lang="en-US" sz="1400" dirty="0">
-                <a:hlinkClick r:id="rId4"/>
-              </a:rPr>
-              <a:t>://</a:t>
-            </a:r>
-            <a:r>
-              <a:rPr lang="en-US" sz="1400" dirty="0" smtClean="0">
-                <a:hlinkClick r:id="rId4"/>
-              </a:rPr>
-              <a:t>dx.doi.org/10.1109/PCS.2009.5167358</a:t>
-            </a:r>
-            <a:r>
-              <a:rPr lang="en-US" sz="1400" dirty="0" smtClean="0"/>
-              <a:t>. </a:t>
-            </a:r>
-          </a:p>
-          <a:p>
-            <a:endParaRPr lang="en-US" sz="1400" dirty="0" smtClean="0"/>
-          </a:p>
-          <a:p>
-            <a:r>
-              <a:rPr lang="pt-BR" sz="1400" dirty="0" smtClean="0"/>
-              <a:t>[5] </a:t>
-            </a:r>
-            <a:r>
-              <a:rPr lang="pt-BR" sz="1400" dirty="0"/>
-              <a:t>Vetro, A. 2010. Representation and Coding Formats for </a:t>
-            </a:r>
-            <a:r>
-              <a:rPr lang="pt-BR" sz="1400" dirty="0" smtClean="0"/>
-              <a:t>Stereo </a:t>
-            </a:r>
-            <a:r>
-              <a:rPr lang="pt-BR" sz="1400" dirty="0"/>
-              <a:t>and Multiview Video. In Studies in Computational </a:t>
-            </a:r>
-            <a:r>
-              <a:rPr lang="pt-BR" sz="1400" dirty="0" smtClean="0"/>
-              <a:t>Intelligence</a:t>
-            </a:r>
-            <a:r>
-              <a:rPr lang="pt-BR" sz="1400" dirty="0"/>
-              <a:t>. Springer Berlin / Heidelberg, 51-73. </a:t>
-            </a:r>
-            <a:r>
-              <a:rPr lang="pt-BR" sz="1400" dirty="0" smtClean="0"/>
-              <a:t>DOI=</a:t>
-            </a:r>
-            <a:r>
-              <a:rPr lang="pt-BR" sz="1400" dirty="0" smtClean="0">
-                <a:hlinkClick r:id="rId5"/>
-              </a:rPr>
-              <a:t>http</a:t>
-            </a:r>
-            <a:r>
-              <a:rPr lang="pt-BR" sz="1400" dirty="0">
-                <a:hlinkClick r:id="rId5"/>
-              </a:rPr>
-              <a:t>://</a:t>
-            </a:r>
-            <a:r>
-              <a:rPr lang="pt-BR" sz="1400" dirty="0" smtClean="0">
-                <a:hlinkClick r:id="rId5"/>
-              </a:rPr>
-              <a:t>dx.doi.org/10.1007/978-3-642-11686-5_2</a:t>
-            </a:r>
-            <a:r>
-              <a:rPr lang="pt-BR" sz="1400" dirty="0" smtClean="0"/>
-              <a:t>.</a:t>
-            </a:r>
-            <a:endParaRPr lang="pt-BR" sz="1400" dirty="0"/>
+            <a:endParaRPr lang="pt-BR" sz="1600" dirty="0"/>
           </a:p>
         </p:txBody>
       </p:sp>
@@ -30731,6 +30341,215 @@
 </file>
 
 <file path=ppt/slides/slide24.xml><?xml version="1.0" encoding="utf-8"?>
+<p:sld xmlns:a="http://schemas.openxmlformats.org/drawingml/2006/main" xmlns:r="http://schemas.openxmlformats.org/officeDocument/2006/relationships" xmlns:p="http://schemas.openxmlformats.org/presentationml/2006/main">
+  <p:cSld>
+    <p:spTree>
+      <p:nvGrpSpPr>
+        <p:cNvPr id="1" name=""/>
+        <p:cNvGrpSpPr/>
+        <p:nvPr/>
+      </p:nvGrpSpPr>
+      <p:grpSpPr>
+        <a:xfrm>
+          <a:off x="0" y="0"/>
+          <a:ext cx="0" cy="0"/>
+          <a:chOff x="0" y="0"/>
+          <a:chExt cx="0" cy="0"/>
+        </a:xfrm>
+      </p:grpSpPr>
+      <p:sp>
+        <p:nvSpPr>
+          <p:cNvPr id="2" name="Título 1"/>
+          <p:cNvSpPr>
+            <a:spLocks noGrp="1"/>
+          </p:cNvSpPr>
+          <p:nvPr>
+            <p:ph type="title"/>
+          </p:nvPr>
+        </p:nvSpPr>
+        <p:spPr/>
+        <p:txBody>
+          <a:bodyPr>
+            <a:normAutofit/>
+          </a:bodyPr>
+          <a:lstStyle/>
+          <a:p>
+            <a:r>
+              <a:rPr lang="en-US" sz="3200" dirty="0" smtClean="0"/>
+              <a:t>References</a:t>
+            </a:r>
+            <a:endParaRPr lang="en-US" sz="3200" dirty="0"/>
+          </a:p>
+        </p:txBody>
+      </p:sp>
+      <p:sp>
+        <p:nvSpPr>
+          <p:cNvPr id="3" name="Espaço Reservado para Conteúdo 2"/>
+          <p:cNvSpPr>
+            <a:spLocks noGrp="1"/>
+          </p:cNvSpPr>
+          <p:nvPr>
+            <p:ph sz="quarter" idx="1"/>
+          </p:nvPr>
+        </p:nvSpPr>
+        <p:spPr/>
+        <p:txBody>
+          <a:bodyPr>
+            <a:normAutofit/>
+          </a:bodyPr>
+          <a:lstStyle/>
+          <a:p>
+            <a:r>
+              <a:rPr lang="pt-BR" sz="1600" dirty="0" smtClean="0"/>
+              <a:t>[</a:t>
+            </a:r>
+            <a:r>
+              <a:rPr lang="pt-BR" sz="1600" dirty="0"/>
+              <a:t>4] </a:t>
+            </a:r>
+            <a:r>
+              <a:rPr lang="en-US" sz="1600" dirty="0" err="1"/>
+              <a:t>Smolic</a:t>
+            </a:r>
+            <a:r>
+              <a:rPr lang="en-US" sz="1600" dirty="0"/>
+              <a:t>, A.; Mueller, K.; </a:t>
+            </a:r>
+            <a:r>
+              <a:rPr lang="en-US" sz="1600" dirty="0" err="1"/>
+              <a:t>Merkle</a:t>
+            </a:r>
+            <a:r>
+              <a:rPr lang="en-US" sz="1600" dirty="0"/>
+              <a:t>, P.; </a:t>
+            </a:r>
+            <a:r>
+              <a:rPr lang="en-US" sz="1600" dirty="0" err="1"/>
+              <a:t>Kauff</a:t>
+            </a:r>
+            <a:r>
+              <a:rPr lang="en-US" sz="1600" dirty="0"/>
+              <a:t>, P.; </a:t>
+            </a:r>
+            <a:r>
+              <a:rPr lang="en-US" sz="1600" dirty="0" err="1"/>
+              <a:t>Wiegand</a:t>
+            </a:r>
+            <a:r>
+              <a:rPr lang="en-US" sz="1600" dirty="0"/>
+              <a:t>, T. 2009. An Overview of Available and Emerging 3D Video Formats and Depth Enhanced Stereo as Efficient Generic Solution. Proceedings of the 27th conference on Picture Coding Symposium, 2009 (May, 2009), 1-4, 6-8. DOI=</a:t>
+            </a:r>
+            <a:r>
+              <a:rPr lang="en-US" sz="1600" dirty="0">
+                <a:hlinkClick r:id="rId2"/>
+              </a:rPr>
+              <a:t>http://dx.doi.org/10.1109/PCS.2009.5167358</a:t>
+            </a:r>
+            <a:r>
+              <a:rPr lang="en-US" sz="1600" dirty="0"/>
+              <a:t>. </a:t>
+            </a:r>
+          </a:p>
+          <a:p>
+            <a:endParaRPr lang="en-US" sz="1600" dirty="0"/>
+          </a:p>
+          <a:p>
+            <a:r>
+              <a:rPr lang="en-US" sz="1600" dirty="0" smtClean="0"/>
+              <a:t>[5] </a:t>
+            </a:r>
+            <a:r>
+              <a:rPr lang="en-US" sz="1600" dirty="0" err="1" smtClean="0"/>
+              <a:t>Vetro</a:t>
+            </a:r>
+            <a:r>
+              <a:rPr lang="en-US" sz="1600" dirty="0" smtClean="0"/>
+              <a:t>, A. 2010. Representation and Coding Formats for Stereo and </a:t>
+            </a:r>
+            <a:r>
+              <a:rPr lang="en-US" sz="1600" dirty="0" err="1" smtClean="0"/>
+              <a:t>Multiview</a:t>
+            </a:r>
+            <a:r>
+              <a:rPr lang="en-US" sz="1600" dirty="0" smtClean="0"/>
+              <a:t> Video. In Studies in Computational Intelligence. Springer Berlin / Heidelberg, 51-73. DOI=</a:t>
+            </a:r>
+            <a:r>
+              <a:rPr lang="en-US" sz="1600" dirty="0" smtClean="0">
+                <a:hlinkClick r:id="rId3"/>
+              </a:rPr>
+              <a:t>http://dx.doi.org/10.1007/978-3-642-11686-5_2</a:t>
+            </a:r>
+            <a:r>
+              <a:rPr lang="en-US" sz="1600" dirty="0" smtClean="0"/>
+              <a:t>.</a:t>
+            </a:r>
+          </a:p>
+          <a:p>
+            <a:endParaRPr lang="pt-BR" dirty="0"/>
+          </a:p>
+        </p:txBody>
+      </p:sp>
+      <p:sp>
+        <p:nvSpPr>
+          <p:cNvPr id="4" name="Espaço Reservado para Número de Slide 3"/>
+          <p:cNvSpPr>
+            <a:spLocks noGrp="1"/>
+          </p:cNvSpPr>
+          <p:nvPr>
+            <p:ph type="sldNum" sz="quarter" idx="15"/>
+          </p:nvPr>
+        </p:nvSpPr>
+        <p:spPr/>
+        <p:txBody>
+          <a:bodyPr/>
+          <a:lstStyle/>
+          <a:p>
+            <a:fld id="{CC2D9971-FBC4-4232-B226-D3882EA6314B}" type="slidenum">
+              <a:rPr lang="pt-BR" smtClean="0"/>
+              <a:t>24</a:t>
+            </a:fld>
+            <a:endParaRPr lang="pt-BR" dirty="0"/>
+          </a:p>
+        </p:txBody>
+      </p:sp>
+      <p:sp>
+        <p:nvSpPr>
+          <p:cNvPr id="5" name="Espaço Reservado para Rodapé 4"/>
+          <p:cNvSpPr>
+            <a:spLocks noGrp="1"/>
+          </p:cNvSpPr>
+          <p:nvPr>
+            <p:ph type="ftr" sz="quarter" idx="16"/>
+          </p:nvPr>
+        </p:nvSpPr>
+        <p:spPr/>
+        <p:txBody>
+          <a:bodyPr/>
+          <a:lstStyle/>
+          <a:p>
+            <a:r>
+              <a:rPr lang="pt-BR" smtClean="0"/>
+              <a:t>XVII WebMedia – Outubro/2011</a:t>
+            </a:r>
+            <a:endParaRPr lang="pt-BR" dirty="0"/>
+          </a:p>
+        </p:txBody>
+      </p:sp>
+    </p:spTree>
+    <p:extLst>
+      <p:ext uri="{BB962C8B-B14F-4D97-AF65-F5344CB8AC3E}">
+        <p14:creationId xmlns:p14="http://schemas.microsoft.com/office/powerpoint/2010/main" val="640724818"/>
+      </p:ext>
+    </p:extLst>
+  </p:cSld>
+  <p:clrMapOvr>
+    <a:masterClrMapping/>
+  </p:clrMapOvr>
+</p:sld>
+</file>
+
+<file path=ppt/slides/slide25.xml><?xml version="1.0" encoding="utf-8"?>
 <p:sld xmlns:a="http://schemas.openxmlformats.org/drawingml/2006/main" xmlns:r="http://schemas.openxmlformats.org/officeDocument/2006/relationships" xmlns:p="http://schemas.openxmlformats.org/presentationml/2006/main">
   <p:cSld>
     <p:spTree>
@@ -30859,7 +30678,7 @@
           <a:p>
             <a:fld id="{CC2D9971-FBC4-4232-B226-D3882EA6314B}" type="slidenum">
               <a:rPr lang="pt-BR" smtClean="0"/>
-              <a:t>24</a:t>
+              <a:t>25</a:t>
             </a:fld>
             <a:endParaRPr lang="pt-BR" dirty="0"/>
           </a:p>
@@ -30867,7 +30686,7 @@
       </p:sp>
       <p:sp>
         <p:nvSpPr>
-          <p:cNvPr id="9" name="Espaço Reservado para Rodapé 4"/>
+          <p:cNvPr id="8" name="Espaço Reservado para Rodapé 4"/>
           <p:cNvSpPr>
             <a:spLocks noGrp="1"/>
           </p:cNvSpPr>
@@ -30878,7 +30697,7 @@
         <p:spPr>
           <a:xfrm>
             <a:off x="5652120" y="6525344"/>
-            <a:ext cx="2448271" cy="337195"/>
+            <a:ext cx="3096344" cy="337195"/>
           </a:xfrm>
           <a:prstGeom prst="rect">
             <a:avLst/>
@@ -30919,7 +30738,7 @@
 </p:sld>
 </file>
 
-<file path=ppt/slides/slide25.xml><?xml version="1.0" encoding="utf-8"?>
+<file path=ppt/slides/slide26.xml><?xml version="1.0" encoding="utf-8"?>
 <p:sld xmlns:a="http://schemas.openxmlformats.org/drawingml/2006/main" xmlns:r="http://schemas.openxmlformats.org/officeDocument/2006/relationships" xmlns:p="http://schemas.openxmlformats.org/presentationml/2006/main">
   <p:cSld>
     <p:spTree>
@@ -30984,136 +30803,13 @@
                   <a:srgbClr val="FFFFFF"/>
                 </a:solidFill>
               </a:rPr>
-              <a:t>25</a:t>
+              <a:t>26</a:t>
             </a:fld>
             <a:endParaRPr lang="pt-BR" sz="1400" b="1" dirty="0">
               <a:solidFill>
                 <a:srgbClr val="FFFFFF"/>
               </a:solidFill>
             </a:endParaRPr>
-          </a:p>
-        </p:txBody>
-      </p:sp>
-      <p:sp>
-        <p:nvSpPr>
-          <p:cNvPr id="11" name="Espaço Reservado para Rodapé 3"/>
-          <p:cNvSpPr txBox="1">
-            <a:spLocks/>
-          </p:cNvSpPr>
-          <p:nvPr/>
-        </p:nvSpPr>
-        <p:spPr>
-          <a:xfrm>
-            <a:off x="4211960" y="6492240"/>
-            <a:ext cx="4536504" cy="365760"/>
-          </a:xfrm>
-          <a:prstGeom prst="rect">
-            <a:avLst/>
-          </a:prstGeom>
-        </p:spPr>
-        <p:txBody>
-          <a:bodyPr vert="horz" anchor="ctr" anchorCtr="0"/>
-          <a:lstStyle>
-            <a:defPPr>
-              <a:defRPr lang="pt-BR"/>
-            </a:defPPr>
-            <a:lvl1pPr marL="0" algn="l" defTabSz="914400" rtl="0" eaLnBrk="1" latinLnBrk="0" hangingPunct="1">
-              <a:defRPr kumimoji="0" sz="1200" kern="1200">
-                <a:solidFill>
-                  <a:schemeClr val="tx2"/>
-                </a:solidFill>
-                <a:latin typeface="+mn-lt"/>
-                <a:ea typeface="+mn-ea"/>
-                <a:cs typeface="+mn-cs"/>
-              </a:defRPr>
-            </a:lvl1pPr>
-            <a:lvl2pPr marL="457200" algn="l" defTabSz="914400" rtl="0" eaLnBrk="1" latinLnBrk="0" hangingPunct="1">
-              <a:defRPr sz="1800" kern="1200">
-                <a:solidFill>
-                  <a:schemeClr val="tx1"/>
-                </a:solidFill>
-                <a:latin typeface="+mn-lt"/>
-                <a:ea typeface="+mn-ea"/>
-                <a:cs typeface="+mn-cs"/>
-              </a:defRPr>
-            </a:lvl2pPr>
-            <a:lvl3pPr marL="914400" algn="l" defTabSz="914400" rtl="0" eaLnBrk="1" latinLnBrk="0" hangingPunct="1">
-              <a:defRPr sz="1800" kern="1200">
-                <a:solidFill>
-                  <a:schemeClr val="tx1"/>
-                </a:solidFill>
-                <a:latin typeface="+mn-lt"/>
-                <a:ea typeface="+mn-ea"/>
-                <a:cs typeface="+mn-cs"/>
-              </a:defRPr>
-            </a:lvl3pPr>
-            <a:lvl4pPr marL="1371600" algn="l" defTabSz="914400" rtl="0" eaLnBrk="1" latinLnBrk="0" hangingPunct="1">
-              <a:defRPr sz="1800" kern="1200">
-                <a:solidFill>
-                  <a:schemeClr val="tx1"/>
-                </a:solidFill>
-                <a:latin typeface="+mn-lt"/>
-                <a:ea typeface="+mn-ea"/>
-                <a:cs typeface="+mn-cs"/>
-              </a:defRPr>
-            </a:lvl4pPr>
-            <a:lvl5pPr marL="1828800" algn="l" defTabSz="914400" rtl="0" eaLnBrk="1" latinLnBrk="0" hangingPunct="1">
-              <a:defRPr sz="1800" kern="1200">
-                <a:solidFill>
-                  <a:schemeClr val="tx1"/>
-                </a:solidFill>
-                <a:latin typeface="+mn-lt"/>
-                <a:ea typeface="+mn-ea"/>
-                <a:cs typeface="+mn-cs"/>
-              </a:defRPr>
-            </a:lvl5pPr>
-            <a:lvl6pPr marL="2286000" algn="l" defTabSz="914400" rtl="0" eaLnBrk="1" latinLnBrk="0" hangingPunct="1">
-              <a:defRPr sz="1800" kern="1200">
-                <a:solidFill>
-                  <a:schemeClr val="tx1"/>
-                </a:solidFill>
-                <a:latin typeface="+mn-lt"/>
-                <a:ea typeface="+mn-ea"/>
-                <a:cs typeface="+mn-cs"/>
-              </a:defRPr>
-            </a:lvl6pPr>
-            <a:lvl7pPr marL="2743200" algn="l" defTabSz="914400" rtl="0" eaLnBrk="1" latinLnBrk="0" hangingPunct="1">
-              <a:defRPr sz="1800" kern="1200">
-                <a:solidFill>
-                  <a:schemeClr val="tx1"/>
-                </a:solidFill>
-                <a:latin typeface="+mn-lt"/>
-                <a:ea typeface="+mn-ea"/>
-                <a:cs typeface="+mn-cs"/>
-              </a:defRPr>
-            </a:lvl7pPr>
-            <a:lvl8pPr marL="3200400" algn="l" defTabSz="914400" rtl="0" eaLnBrk="1" latinLnBrk="0" hangingPunct="1">
-              <a:defRPr sz="1800" kern="1200">
-                <a:solidFill>
-                  <a:schemeClr val="tx1"/>
-                </a:solidFill>
-                <a:latin typeface="+mn-lt"/>
-                <a:ea typeface="+mn-ea"/>
-                <a:cs typeface="+mn-cs"/>
-              </a:defRPr>
-            </a:lvl8pPr>
-            <a:lvl9pPr marL="3657600" algn="l" defTabSz="914400" rtl="0" eaLnBrk="1" latinLnBrk="0" hangingPunct="1">
-              <a:defRPr sz="1800" kern="1200">
-                <a:solidFill>
-                  <a:schemeClr val="tx1"/>
-                </a:solidFill>
-                <a:latin typeface="+mn-lt"/>
-                <a:ea typeface="+mn-ea"/>
-                <a:cs typeface="+mn-cs"/>
-              </a:defRPr>
-            </a:lvl9pPr>
-          </a:lstStyle>
-          <a:p>
-            <a:r>
-              <a:rPr lang="pt-BR" dirty="0" smtClean="0"/>
-              <a:t>Qualificação Mestrado – Matheus Ricardo Uihara Zingarelli</a:t>
-            </a:r>
-            <a:endParaRPr lang="pt-BR" dirty="0"/>
           </a:p>
         </p:txBody>
       </p:sp>
@@ -31212,7 +30908,34 @@
               <a:rPr lang="en-US" dirty="0" smtClean="0"/>
               <a:t> conversion &amp; reversion</a:t>
             </a:r>
-            <a:endParaRPr lang="en-US" dirty="0" smtClean="0"/>
+          </a:p>
+        </p:txBody>
+      </p:sp>
+      <p:sp>
+        <p:nvSpPr>
+          <p:cNvPr id="6" name="Espaço Reservado para Rodapé 4"/>
+          <p:cNvSpPr>
+            <a:spLocks noGrp="1"/>
+          </p:cNvSpPr>
+          <p:nvPr>
+            <p:ph type="ftr" sz="quarter" idx="16"/>
+          </p:nvPr>
+        </p:nvSpPr>
+        <p:spPr>
+          <a:xfrm>
+            <a:off x="5652120" y="6525344"/>
+            <a:ext cx="2952328" cy="337195"/>
+          </a:xfrm>
+        </p:spPr>
+        <p:txBody>
+          <a:bodyPr/>
+          <a:lstStyle/>
+          <a:p>
+            <a:r>
+              <a:rPr lang="pt-BR" dirty="0" smtClean="0"/>
+              <a:t>XVII WebMedia – Outubro/2011</a:t>
+            </a:r>
+            <a:endParaRPr lang="pt-BR" dirty="0"/>
           </a:p>
         </p:txBody>
       </p:sp>
@@ -31357,7 +31080,7 @@
         <p:spPr>
           <a:xfrm>
             <a:off x="5652120" y="6525344"/>
-            <a:ext cx="2448271" cy="337195"/>
+            <a:ext cx="3096344" cy="337195"/>
           </a:xfrm>
           <a:prstGeom prst="rect">
             <a:avLst/>
@@ -32238,7 +31961,7 @@
         <p:spPr>
           <a:xfrm>
             <a:off x="3707904" y="5517232"/>
-            <a:ext cx="2448272" cy="792088"/>
+            <a:ext cx="2592288" cy="792088"/>
           </a:xfrm>
           <a:prstGeom prst="wedgeEllipseCallout">
             <a:avLst>
@@ -32423,13 +32146,13 @@
           <p:nvPr>
             <p:extLst>
               <p:ext uri="{D42A27DB-BD31-4B8C-83A1-F6EECF244321}">
-                <p14:modId xmlns:p14="http://schemas.microsoft.com/office/powerpoint/2010/main" val="102427262"/>
+                <p14:modId xmlns:p14="http://schemas.microsoft.com/office/powerpoint/2010/main" val="2026806746"/>
               </p:ext>
             </p:extLst>
           </p:nvPr>
         </p:nvGraphicFramePr>
         <p:xfrm>
-          <a:off x="179512" y="2708920"/>
+          <a:off x="179512" y="2636912"/>
           <a:ext cx="8496944" cy="3024336"/>
         </p:xfrm>
         <a:graphic>

</xml_diff>